<commit_message>
add two lecture notes
</commit_message>
<xml_diff>
--- a/course/sa/LectureNotes/(Spring2018)Lecture8.pptx
+++ b/course/sa/LectureNotes/(Spring2018)Lecture8.pptx
@@ -5,10 +5,10 @@
     <p:sldMasterId id="2147483648" r:id="rId4"/>
   </p:sldMasterIdLst>
   <p:notesMasterIdLst>
-    <p:notesMasterId r:id="rId44"/>
+    <p:notesMasterId r:id="rId45"/>
   </p:notesMasterIdLst>
   <p:handoutMasterIdLst>
-    <p:handoutMasterId r:id="rId45"/>
+    <p:handoutMasterId r:id="rId46"/>
   </p:handoutMasterIdLst>
   <p:sldIdLst>
     <p:sldId id="256" r:id="rId5"/>
@@ -40,16 +40,17 @@
     <p:sldId id="294" r:id="rId31"/>
     <p:sldId id="295" r:id="rId32"/>
     <p:sldId id="286" r:id="rId33"/>
-    <p:sldId id="296" r:id="rId34"/>
-    <p:sldId id="287" r:id="rId35"/>
-    <p:sldId id="297" r:id="rId36"/>
-    <p:sldId id="298" r:id="rId37"/>
-    <p:sldId id="299" r:id="rId38"/>
-    <p:sldId id="300" r:id="rId39"/>
-    <p:sldId id="304" r:id="rId40"/>
-    <p:sldId id="301" r:id="rId41"/>
-    <p:sldId id="303" r:id="rId42"/>
-    <p:sldId id="302" r:id="rId43"/>
+    <p:sldId id="305" r:id="rId34"/>
+    <p:sldId id="296" r:id="rId35"/>
+    <p:sldId id="287" r:id="rId36"/>
+    <p:sldId id="297" r:id="rId37"/>
+    <p:sldId id="298" r:id="rId38"/>
+    <p:sldId id="299" r:id="rId39"/>
+    <p:sldId id="300" r:id="rId40"/>
+    <p:sldId id="304" r:id="rId41"/>
+    <p:sldId id="301" r:id="rId42"/>
+    <p:sldId id="303" r:id="rId43"/>
+    <p:sldId id="302" r:id="rId44"/>
   </p:sldIdLst>
   <p:sldSz cx="9144000" cy="6858000" type="screen4x3"/>
   <p:notesSz cx="6858000" cy="9144000"/>
@@ -261,7 +262,7 @@
                 <a:ea typeface="微软雅黑" panose="020B0503020204020204" pitchFamily="34" charset="-122"/>
               </a:rPr>
               <a:pPr algn="r" rtl="0"/>
-              <a:t>2018/3/26</a:t>
+              <a:t>2018/3/29</a:t>
             </a:fld>
             <a:endParaRPr lang="zh-CN" altLang="en-US" dirty="0">
               <a:latin typeface="微软雅黑" panose="020B0503020204020204" pitchFamily="34" charset="-122"/>
@@ -448,7 +449,7 @@
             <a:fld id="{229B22C3-6CB1-491B-AD00-E0837F23A3F3}" type="datetime1">
               <a:rPr lang="zh-CN" altLang="en-US" smtClean="0"/>
               <a:pPr/>
-              <a:t>2018/3/26</a:t>
+              <a:t>2018/3/29</a:t>
             </a:fld>
             <a:endParaRPr lang="zh-CN" altLang="en-US" dirty="0"/>
           </a:p>
@@ -1044,7 +1045,7 @@
             <a:fld id="{A7392AAC-879E-4B39-8824-AF6B730A809E}" type="datetime1">
               <a:rPr lang="zh-CN" altLang="en-US" smtClean="0"/>
               <a:pPr/>
-              <a:t>2018/3/26</a:t>
+              <a:t>2018/3/29</a:t>
             </a:fld>
             <a:endParaRPr lang="zh-CN" altLang="en-US" dirty="0"/>
           </a:p>
@@ -1385,7 +1386,7 @@
             <a:fld id="{7118C275-B304-48F5-8C4F-015CBCF4E7C1}" type="datetime1">
               <a:rPr lang="zh-CN" altLang="en-US" smtClean="0"/>
               <a:pPr/>
-              <a:t>2018/3/26</a:t>
+              <a:t>2018/3/29</a:t>
             </a:fld>
             <a:r>
               <a:rPr lang="zh-CN" altLang="en-US" dirty="0"/>
@@ -1591,7 +1592,7 @@
             <a:fld id="{98791AA9-DDCB-4BA8-AD1D-963A3AA00622}" type="datetime1">
               <a:rPr lang="zh-CN" altLang="en-US" smtClean="0"/>
               <a:pPr/>
-              <a:t>2018/3/26</a:t>
+              <a:t>2018/3/29</a:t>
             </a:fld>
             <a:endParaRPr lang="zh-CN" altLang="en-US" dirty="0"/>
           </a:p>
@@ -1795,7 +1796,7 @@
             <a:fld id="{9170426F-E661-472B-BE42-25E072CD46D9}" type="datetime1">
               <a:rPr lang="zh-CN" altLang="en-US" smtClean="0"/>
               <a:pPr/>
-              <a:t>2018/3/26</a:t>
+              <a:t>2018/3/29</a:t>
             </a:fld>
             <a:endParaRPr lang="zh-CN" altLang="en-US" dirty="0"/>
           </a:p>
@@ -2117,7 +2118,7 @@
             <a:fld id="{9BA78444-6099-4C0A-A3A9-C6F3C5D7F289}" type="datetime1">
               <a:rPr lang="zh-CN" altLang="en-US" smtClean="0"/>
               <a:pPr/>
-              <a:t>2018/3/26</a:t>
+              <a:t>2018/3/29</a:t>
             </a:fld>
             <a:endParaRPr lang="zh-CN" altLang="en-US" dirty="0"/>
           </a:p>
@@ -3229,7 +3230,7 @@
             <a:fld id="{AF5F6A19-70BF-4380-9A40-68C9536408C6}" type="datetime1">
               <a:rPr lang="zh-CN" altLang="en-US" smtClean="0"/>
               <a:pPr/>
-              <a:t>2018/3/26</a:t>
+              <a:t>2018/3/29</a:t>
             </a:fld>
             <a:endParaRPr lang="zh-CN" altLang="en-US" dirty="0"/>
           </a:p>
@@ -3628,7 +3629,7 @@
             <a:fld id="{6017EB90-196C-4C15-BD31-13E0E0436C73}" type="datetime1">
               <a:rPr lang="zh-CN" altLang="en-US" smtClean="0"/>
               <a:pPr/>
-              <a:t>2018/3/26</a:t>
+              <a:t>2018/3/29</a:t>
             </a:fld>
             <a:r>
               <a:rPr lang="zh-CN" altLang="en-US" dirty="0"/>
@@ -4110,7 +4111,7 @@
             <a:fld id="{C2EC0F41-B48F-4298-A7F6-618EB9D22195}" type="datetime1">
               <a:rPr lang="zh-CN" altLang="en-US" smtClean="0"/>
               <a:pPr/>
-              <a:t>2018/3/26</a:t>
+              <a:t>2018/3/29</a:t>
             </a:fld>
             <a:endParaRPr lang="zh-CN" altLang="en-US" dirty="0"/>
           </a:p>
@@ -4261,7 +4262,7 @@
             <a:fld id="{7DB2D836-56E8-4B15-857C-14B1A5B3B67B}" type="datetime1">
               <a:rPr lang="zh-CN" altLang="en-US" smtClean="0"/>
               <a:pPr/>
-              <a:t>2018/3/26</a:t>
+              <a:t>2018/3/29</a:t>
             </a:fld>
             <a:endParaRPr lang="zh-CN" altLang="en-US" dirty="0"/>
           </a:p>
@@ -4379,7 +4380,7 @@
             <a:fld id="{038D929F-7D8C-4CC3-8AC7-BB9B8FE2DEBF}" type="datetime1">
               <a:rPr lang="zh-CN" altLang="en-US" smtClean="0"/>
               <a:pPr/>
-              <a:t>2018/3/26</a:t>
+              <a:t>2018/3/29</a:t>
             </a:fld>
             <a:endParaRPr lang="zh-CN" altLang="en-US" dirty="0"/>
           </a:p>
@@ -4682,7 +4683,7 @@
             <a:fld id="{F7892ACC-8BC8-4C9E-9D2B-0669DA5038B6}" type="datetime1">
               <a:rPr lang="zh-CN" altLang="en-US" smtClean="0"/>
               <a:pPr/>
-              <a:t>2018/3/26</a:t>
+              <a:t>2018/3/29</a:t>
             </a:fld>
             <a:endParaRPr lang="zh-CN" altLang="en-US" dirty="0"/>
           </a:p>
@@ -4948,7 +4949,7 @@
             <a:fld id="{660B6A15-7713-4A08-BBFD-F297CCC2B976}" type="datetime1">
               <a:rPr lang="zh-CN" altLang="en-US" smtClean="0"/>
               <a:pPr/>
-              <a:t>2018/3/26</a:t>
+              <a:t>2018/3/29</a:t>
             </a:fld>
             <a:r>
               <a:rPr lang="zh-CN" altLang="en-US" dirty="0"/>
@@ -11367,12 +11368,8 @@
           <a:p>
             <a:pPr lvl="1"/>
             <a:r>
-              <a:rPr lang="zh-CN" altLang="zh-CN" sz="2000" dirty="0"/>
-              <a:t>C</a:t>
-            </a:r>
-            <a:r>
               <a:rPr lang="en-US" altLang="zh-CN" sz="2000" dirty="0" err="1"/>
-              <a:t>oncreteIterator</a:t>
+              <a:t>ConcreteIterator</a:t>
             </a:r>
             <a:endParaRPr lang="en-US" altLang="zh-CN" sz="2000" dirty="0"/>
           </a:p>
@@ -14374,7 +14371,13 @@
       </p:grpSpPr>
       <p:sp>
         <p:nvSpPr>
-          <p:cNvPr id="2" name="标题 1"/>
+          <p:cNvPr id="2" name="标题 1">
+            <a:extLst>
+              <a:ext uri="{FF2B5EF4-FFF2-40B4-BE49-F238E27FC236}">
+                <a16:creationId xmlns:a16="http://schemas.microsoft.com/office/drawing/2014/main" id="{77C5C39A-413A-4641-BB32-DCE1D1B31C24}"/>
+              </a:ext>
+            </a:extLst>
+          </p:cNvPr>
           <p:cNvSpPr>
             <a:spLocks noGrp="1"/>
           </p:cNvSpPr>
@@ -14384,42 +14387,284 @@
         </p:nvSpPr>
         <p:spPr/>
         <p:txBody>
-          <a:bodyPr rtlCol="0"/>
+          <a:bodyPr/>
           <a:lstStyle/>
           <a:p>
-            <a:pPr rtl="0"/>
-            <a:r>
-              <a:rPr lang="en-US" altLang="zh-CN" dirty="0"/>
-              <a:t>mediator</a:t>
-            </a:r>
-            <a:endParaRPr lang="en-US" dirty="0"/>
+            <a:r>
+              <a:rPr lang="en-US" altLang="zh-CN" dirty="0"/>
+              <a:t>Example</a:t>
+            </a:r>
+            <a:endParaRPr lang="zh-CN" altLang="en-US" dirty="0"/>
           </a:p>
         </p:txBody>
       </p:sp>
       <p:sp>
         <p:nvSpPr>
-          <p:cNvPr id="3" name="文本占位符 2"/>
+          <p:cNvPr id="3" name="内容占位符 2">
+            <a:extLst>
+              <a:ext uri="{FF2B5EF4-FFF2-40B4-BE49-F238E27FC236}">
+                <a16:creationId xmlns:a16="http://schemas.microsoft.com/office/drawing/2014/main" id="{79A887AA-D3DA-4CAD-9F33-1F0E4F526FA9}"/>
+              </a:ext>
+            </a:extLst>
+          </p:cNvPr>
           <p:cNvSpPr>
             <a:spLocks noGrp="1"/>
           </p:cNvSpPr>
           <p:nvPr>
-            <p:ph type="body" idx="1"/>
+            <p:ph idx="1"/>
           </p:nvPr>
         </p:nvSpPr>
-        <p:spPr/>
+        <p:spPr>
+          <a:xfrm>
+            <a:off x="828675" y="1313895"/>
+            <a:ext cx="7486650" cy="5362113"/>
+          </a:xfrm>
+        </p:spPr>
         <p:txBody>
-          <a:bodyPr rtlCol="0"/>
+          <a:bodyPr>
+            <a:normAutofit fontScale="70000" lnSpcReduction="20000"/>
+          </a:bodyPr>
           <a:lstStyle/>
           <a:p>
-            <a:pPr rtl="0"/>
-            <a:endParaRPr lang="en-US"/>
+            <a:r>
+              <a:rPr lang="en-GB" altLang="zh-CN" sz="2500" dirty="0" err="1"/>
+              <a:t>int</a:t>
+            </a:r>
+            <a:r>
+              <a:rPr lang="en-GB" altLang="zh-CN" sz="2500" dirty="0"/>
+              <a:t> main(){</a:t>
+            </a:r>
+          </a:p>
+          <a:p>
+            <a:r>
+              <a:rPr lang="en-GB" altLang="zh-CN" sz="2500" dirty="0"/>
+              <a:t>    deque&lt;</a:t>
+            </a:r>
+            <a:r>
+              <a:rPr lang="en-GB" altLang="zh-CN" sz="2500" dirty="0" err="1"/>
+              <a:t>int</a:t>
+            </a:r>
+            <a:r>
+              <a:rPr lang="en-GB" altLang="zh-CN" sz="2500" dirty="0"/>
+              <a:t>&gt; </a:t>
+            </a:r>
+            <a:r>
+              <a:rPr lang="en-GB" altLang="zh-CN" sz="2500" dirty="0" err="1"/>
+              <a:t>coll</a:t>
+            </a:r>
+            <a:r>
+              <a:rPr lang="en-GB" altLang="zh-CN" sz="2500" dirty="0"/>
+              <a:t>;</a:t>
+            </a:r>
+          </a:p>
+          <a:p>
+            <a:r>
+              <a:rPr lang="en-GB" altLang="zh-CN" sz="2500" dirty="0"/>
+              <a:t>    deque&lt;</a:t>
+            </a:r>
+            <a:r>
+              <a:rPr lang="en-GB" altLang="zh-CN" sz="2500" dirty="0" err="1"/>
+              <a:t>int</a:t>
+            </a:r>
+            <a:r>
+              <a:rPr lang="en-GB" altLang="zh-CN" sz="2500" dirty="0"/>
+              <a:t>&gt;::iterator pos1;</a:t>
+            </a:r>
+          </a:p>
+          <a:p>
+            <a:r>
+              <a:rPr lang="en-GB" altLang="zh-CN" sz="2500" dirty="0"/>
+              <a:t>    pos1 = find(</a:t>
+            </a:r>
+            <a:r>
+              <a:rPr lang="en-GB" altLang="zh-CN" sz="2500" dirty="0" err="1"/>
+              <a:t>coll.begin</a:t>
+            </a:r>
+            <a:r>
+              <a:rPr lang="en-GB" altLang="zh-CN" sz="2500" dirty="0"/>
+              <a:t>(), </a:t>
+            </a:r>
+            <a:r>
+              <a:rPr lang="en-GB" altLang="zh-CN" sz="2500" dirty="0" err="1"/>
+              <a:t>coll.end</a:t>
+            </a:r>
+            <a:r>
+              <a:rPr lang="en-GB" altLang="zh-CN" sz="2500" dirty="0"/>
+              <a:t>(), 2);</a:t>
+            </a:r>
+          </a:p>
+          <a:p>
+            <a:r>
+              <a:rPr lang="en-GB" altLang="zh-CN" sz="2500" dirty="0"/>
+              <a:t>    deque&lt;</a:t>
+            </a:r>
+            <a:r>
+              <a:rPr lang="en-GB" altLang="zh-CN" sz="2500" dirty="0" err="1"/>
+              <a:t>int</a:t>
+            </a:r>
+            <a:r>
+              <a:rPr lang="en-GB" altLang="zh-CN" sz="2500" dirty="0"/>
+              <a:t>&gt;::iterator pos2;</a:t>
+            </a:r>
+          </a:p>
+          <a:p>
+            <a:r>
+              <a:rPr lang="en-GB" altLang="zh-CN" sz="2500" dirty="0"/>
+              <a:t>    pos2 = find(</a:t>
+            </a:r>
+            <a:r>
+              <a:rPr lang="en-GB" altLang="zh-CN" sz="2500" dirty="0" err="1"/>
+              <a:t>coll.begin</a:t>
+            </a:r>
+            <a:r>
+              <a:rPr lang="en-GB" altLang="zh-CN" sz="2500" dirty="0"/>
+              <a:t>(), </a:t>
+            </a:r>
+            <a:r>
+              <a:rPr lang="en-GB" altLang="zh-CN" sz="2500" dirty="0" err="1"/>
+              <a:t>coll.end</a:t>
+            </a:r>
+            <a:r>
+              <a:rPr lang="en-GB" altLang="zh-CN" sz="2500" dirty="0"/>
+              <a:t>(), 7);</a:t>
+            </a:r>
+          </a:p>
+          <a:p>
+            <a:r>
+              <a:rPr lang="en-GB" altLang="zh-CN" sz="2500" dirty="0"/>
+              <a:t>    </a:t>
+            </a:r>
+            <a:r>
+              <a:rPr lang="en-GB" altLang="zh-CN" sz="2500" dirty="0" err="1"/>
+              <a:t>for_each</a:t>
+            </a:r>
+            <a:r>
+              <a:rPr lang="en-GB" altLang="zh-CN" sz="2500" dirty="0"/>
+              <a:t>(pos1, pos2, print);</a:t>
+            </a:r>
+          </a:p>
+          <a:p>
+            <a:r>
+              <a:rPr lang="en-GB" altLang="zh-CN" sz="2500" dirty="0"/>
+              <a:t>    </a:t>
+            </a:r>
+            <a:r>
+              <a:rPr lang="en-GB" altLang="zh-CN" sz="2500" dirty="0" err="1"/>
+              <a:t>cout</a:t>
+            </a:r>
+            <a:r>
+              <a:rPr lang="en-GB" altLang="zh-CN" sz="2500" dirty="0"/>
+              <a:t> &lt;&lt; </a:t>
+            </a:r>
+            <a:r>
+              <a:rPr lang="en-GB" altLang="zh-CN" sz="2500" dirty="0" err="1"/>
+              <a:t>endl</a:t>
+            </a:r>
+            <a:r>
+              <a:rPr lang="en-GB" altLang="zh-CN" sz="2500" dirty="0"/>
+              <a:t>;</a:t>
+            </a:r>
+          </a:p>
+          <a:p>
+            <a:r>
+              <a:rPr lang="en-GB" altLang="zh-CN" sz="2500" dirty="0"/>
+              <a:t>    deque&lt;</a:t>
+            </a:r>
+            <a:r>
+              <a:rPr lang="en-GB" altLang="zh-CN" sz="2500" dirty="0" err="1"/>
+              <a:t>int</a:t>
+            </a:r>
+            <a:r>
+              <a:rPr lang="en-GB" altLang="zh-CN" sz="2500" dirty="0"/>
+              <a:t>&gt;::</a:t>
+            </a:r>
+            <a:r>
+              <a:rPr lang="en-GB" altLang="zh-CN" sz="2500" dirty="0" err="1"/>
+              <a:t>reverse_iterator</a:t>
+            </a:r>
+            <a:r>
+              <a:rPr lang="en-GB" altLang="zh-CN" sz="2500" dirty="0"/>
+              <a:t> rpos1(pos1);</a:t>
+            </a:r>
+          </a:p>
+          <a:p>
+            <a:r>
+              <a:rPr lang="en-GB" altLang="zh-CN" sz="2500" dirty="0"/>
+              <a:t>    deque&lt;</a:t>
+            </a:r>
+            <a:r>
+              <a:rPr lang="en-GB" altLang="zh-CN" sz="2500" dirty="0" err="1"/>
+              <a:t>int</a:t>
+            </a:r>
+            <a:r>
+              <a:rPr lang="en-GB" altLang="zh-CN" sz="2500" dirty="0"/>
+              <a:t>&gt;::</a:t>
+            </a:r>
+            <a:r>
+              <a:rPr lang="en-GB" altLang="zh-CN" sz="2500" dirty="0" err="1"/>
+              <a:t>reverse_iterator</a:t>
+            </a:r>
+            <a:r>
+              <a:rPr lang="en-GB" altLang="zh-CN" sz="2500" dirty="0"/>
+              <a:t> rpos2(pos2);</a:t>
+            </a:r>
+          </a:p>
+          <a:p>
+            <a:r>
+              <a:rPr lang="en-GB" altLang="zh-CN" sz="2500" dirty="0"/>
+              <a:t>    </a:t>
+            </a:r>
+            <a:r>
+              <a:rPr lang="en-GB" altLang="zh-CN" sz="2500" dirty="0" err="1"/>
+              <a:t>for_each</a:t>
+            </a:r>
+            <a:r>
+              <a:rPr lang="en-GB" altLang="zh-CN" sz="2500" dirty="0"/>
+              <a:t>(rpos2, rpos1, print);</a:t>
+            </a:r>
+          </a:p>
+          <a:p>
+            <a:r>
+              <a:rPr lang="en-GB" altLang="zh-CN" sz="2500" dirty="0"/>
+              <a:t>    </a:t>
+            </a:r>
+            <a:r>
+              <a:rPr lang="en-GB" altLang="zh-CN" sz="2500" dirty="0" err="1"/>
+              <a:t>cout</a:t>
+            </a:r>
+            <a:r>
+              <a:rPr lang="en-GB" altLang="zh-CN" sz="2500" dirty="0"/>
+              <a:t> &lt;&lt; </a:t>
+            </a:r>
+            <a:r>
+              <a:rPr lang="en-GB" altLang="zh-CN" sz="2500" dirty="0" err="1"/>
+              <a:t>endl</a:t>
+            </a:r>
+            <a:r>
+              <a:rPr lang="en-GB" altLang="zh-CN" sz="2500" dirty="0"/>
+              <a:t>;</a:t>
+            </a:r>
+          </a:p>
+          <a:p>
+            <a:r>
+              <a:rPr lang="en-GB" altLang="zh-CN" sz="2500" dirty="0"/>
+              <a:t>    return 0;</a:t>
+            </a:r>
+            <a:r>
+              <a:rPr lang="en-US" altLang="zh-CN" sz="2500" dirty="0"/>
+              <a:t>}</a:t>
+            </a:r>
+            <a:endParaRPr lang="en-GB" altLang="zh-CN" sz="2500" dirty="0"/>
+          </a:p>
+          <a:p>
+            <a:endParaRPr lang="zh-CN" altLang="en-US" dirty="0"/>
           </a:p>
         </p:txBody>
       </p:sp>
     </p:spTree>
     <p:extLst>
       <p:ext uri="{BB962C8B-B14F-4D97-AF65-F5344CB8AC3E}">
-        <p14:creationId xmlns:p14="http://schemas.microsoft.com/office/powerpoint/2010/main" val="1592574077"/>
+        <p14:creationId xmlns:p14="http://schemas.microsoft.com/office/powerpoint/2010/main" val="2633128357"/>
       </p:ext>
     </p:extLst>
   </p:cSld>
@@ -14460,6 +14705,92 @@
       </p:grpSpPr>
       <p:sp>
         <p:nvSpPr>
+          <p:cNvPr id="2" name="标题 1"/>
+          <p:cNvSpPr>
+            <a:spLocks noGrp="1"/>
+          </p:cNvSpPr>
+          <p:nvPr>
+            <p:ph type="title"/>
+          </p:nvPr>
+        </p:nvSpPr>
+        <p:spPr/>
+        <p:txBody>
+          <a:bodyPr rtlCol="0"/>
+          <a:lstStyle/>
+          <a:p>
+            <a:pPr rtl="0"/>
+            <a:r>
+              <a:rPr lang="en-US" altLang="zh-CN" dirty="0"/>
+              <a:t>mediator</a:t>
+            </a:r>
+            <a:endParaRPr lang="en-US" dirty="0"/>
+          </a:p>
+        </p:txBody>
+      </p:sp>
+      <p:sp>
+        <p:nvSpPr>
+          <p:cNvPr id="3" name="文本占位符 2"/>
+          <p:cNvSpPr>
+            <a:spLocks noGrp="1"/>
+          </p:cNvSpPr>
+          <p:nvPr>
+            <p:ph type="body" idx="1"/>
+          </p:nvPr>
+        </p:nvSpPr>
+        <p:spPr/>
+        <p:txBody>
+          <a:bodyPr rtlCol="0"/>
+          <a:lstStyle/>
+          <a:p>
+            <a:pPr rtl="0"/>
+            <a:endParaRPr lang="en-US"/>
+          </a:p>
+        </p:txBody>
+      </p:sp>
+    </p:spTree>
+    <p:extLst>
+      <p:ext uri="{BB962C8B-B14F-4D97-AF65-F5344CB8AC3E}">
+        <p14:creationId xmlns:p14="http://schemas.microsoft.com/office/powerpoint/2010/main" val="1592574077"/>
+      </p:ext>
+    </p:extLst>
+  </p:cSld>
+  <p:clrMapOvr>
+    <a:masterClrMapping/>
+  </p:clrMapOvr>
+  <mc:AlternateContent xmlns:mc="http://schemas.openxmlformats.org/markup-compatibility/2006" xmlns:p14="http://schemas.microsoft.com/office/powerpoint/2010/main">
+    <mc:Choice Requires="p14">
+      <p:transition spd="med" p14:dur="700">
+        <p:fade/>
+      </p:transition>
+    </mc:Choice>
+    <mc:Fallback xmlns="">
+      <p:transition spd="med">
+        <p:fade/>
+      </p:transition>
+    </mc:Fallback>
+  </mc:AlternateContent>
+</p:sld>
+</file>
+
+<file path=ppt/slides/slide32.xml><?xml version="1.0" encoding="utf-8"?>
+<p:sld xmlns:a="http://schemas.openxmlformats.org/drawingml/2006/main" xmlns:r="http://schemas.openxmlformats.org/officeDocument/2006/relationships" xmlns:p="http://schemas.openxmlformats.org/presentationml/2006/main">
+  <p:cSld>
+    <p:spTree>
+      <p:nvGrpSpPr>
+        <p:cNvPr id="1" name=""/>
+        <p:cNvGrpSpPr/>
+        <p:nvPr/>
+      </p:nvGrpSpPr>
+      <p:grpSpPr>
+        <a:xfrm>
+          <a:off x="0" y="0"/>
+          <a:ext cx="0" cy="0"/>
+          <a:chOff x="0" y="0"/>
+          <a:chExt cx="0" cy="0"/>
+        </a:xfrm>
+      </p:grpSpPr>
+      <p:sp>
+        <p:nvSpPr>
           <p:cNvPr id="13" name="标题 12"/>
           <p:cNvSpPr>
             <a:spLocks noGrp="1"/>
@@ -14503,7 +14834,7 @@
         </p:spPr>
         <p:txBody>
           <a:bodyPr rtlCol="0">
-            <a:normAutofit fontScale="92500" lnSpcReduction="10000"/>
+            <a:normAutofit/>
           </a:bodyPr>
           <a:lstStyle/>
           <a:p>
@@ -14514,7 +14845,7 @@
             </a:pPr>
             <a:r>
               <a:rPr lang="en-US" sz="1500" dirty="0"/>
-              <a:t>In the airport command system, aircraft that take off and land at the same airport do not directly communicate with each other, but each aircraft communicates directly with the command system. The command system then directs all aircraft to take off and land in accordance with the rules. In the airport command system, aircraft that take off and land at the same airport do not directly communicate with each other, but each aircraft communicates directly with the command system. The command system then directs all aircraft to take off and land in accordance with the rules. For example, when an aircraft (A1) fails and requires an emergency landing at an airport, the aircraft does not directly talk to all the aircraft at the airport, as shown in Figure 1. Instead, a request was made directly to the airport command center, requesting an emergency landing, and then the airport directed all the appropriate aircraft to give up the runway, as shown in Figure 2.</a:t>
+              <a:t>In the airport command system, aircraft that take off and land at the same airport do not directly communicate with each other, but each aircraft communicates directly with the command system. The command system then directs all aircraft to take off and land in accordance with the rules. For example, when an aircraft (A1) fails and requires an emergency landing at an airport, the aircraft does not directly talk to all the aircraft at the airport, as shown in Figure 1. Instead, a request was made directly to the airport command center, requesting an emergency landing, and then the airport directed all the appropriate aircraft to give up the runway, as shown in Figure 2.</a:t>
             </a:r>
           </a:p>
           <a:p>
@@ -14689,7 +15020,7 @@
 </p:sld>
 </file>
 
-<file path=ppt/slides/slide32.xml><?xml version="1.0" encoding="utf-8"?>
+<file path=ppt/slides/slide33.xml><?xml version="1.0" encoding="utf-8"?>
 <p:sld xmlns:a="http://schemas.openxmlformats.org/drawingml/2006/main" xmlns:r="http://schemas.openxmlformats.org/officeDocument/2006/relationships" xmlns:p="http://schemas.openxmlformats.org/presentationml/2006/main">
   <p:cSld>
     <p:spTree>
@@ -14893,180 +15224,6 @@
             <a:r>
               <a:rPr kumimoji="1" lang="en-US" altLang="zh-CN" sz="1400" dirty="0"/>
               <a:t>Figure 4</a:t>
-            </a:r>
-            <a:endParaRPr kumimoji="1" lang="zh-CN" altLang="en-US" sz="1400" dirty="0"/>
-          </a:p>
-        </p:txBody>
-      </p:sp>
-    </p:spTree>
-    <p:extLst>
-      <p:ext uri="{BB962C8B-B14F-4D97-AF65-F5344CB8AC3E}">
-        <p14:creationId xmlns:p14="http://schemas.microsoft.com/office/powerpoint/2010/main" val="3108725272"/>
-      </p:ext>
-    </p:extLst>
-  </p:cSld>
-  <p:clrMapOvr>
-    <a:masterClrMapping/>
-  </p:clrMapOvr>
-  <mc:AlternateContent xmlns:mc="http://schemas.openxmlformats.org/markup-compatibility/2006" xmlns:p14="http://schemas.microsoft.com/office/powerpoint/2010/main">
-    <mc:Choice Requires="p14">
-      <p:transition spd="med" p14:dur="700">
-        <p:fade/>
-      </p:transition>
-    </mc:Choice>
-    <mc:Fallback xmlns="">
-      <p:transition spd="med">
-        <p:fade/>
-      </p:transition>
-    </mc:Fallback>
-  </mc:AlternateContent>
-</p:sld>
-</file>
-
-<file path=ppt/slides/slide33.xml><?xml version="1.0" encoding="utf-8"?>
-<p:sld xmlns:a="http://schemas.openxmlformats.org/drawingml/2006/main" xmlns:r="http://schemas.openxmlformats.org/officeDocument/2006/relationships" xmlns:p="http://schemas.openxmlformats.org/presentationml/2006/main">
-  <p:cSld>
-    <p:spTree>
-      <p:nvGrpSpPr>
-        <p:cNvPr id="1" name=""/>
-        <p:cNvGrpSpPr/>
-        <p:nvPr/>
-      </p:nvGrpSpPr>
-      <p:grpSpPr>
-        <a:xfrm>
-          <a:off x="0" y="0"/>
-          <a:ext cx="0" cy="0"/>
-          <a:chOff x="0" y="0"/>
-          <a:chExt cx="0" cy="0"/>
-        </a:xfrm>
-      </p:grpSpPr>
-      <p:sp>
-        <p:nvSpPr>
-          <p:cNvPr id="13" name="标题 12"/>
-          <p:cNvSpPr>
-            <a:spLocks noGrp="1"/>
-          </p:cNvSpPr>
-          <p:nvPr>
-            <p:ph type="title"/>
-          </p:nvPr>
-        </p:nvSpPr>
-        <p:spPr/>
-        <p:txBody>
-          <a:bodyPr rtlCol="0"/>
-          <a:lstStyle/>
-          <a:p>
-            <a:pPr rtl="0"/>
-            <a:r>
-              <a:rPr lang="en-US" altLang="zh-CN" dirty="0"/>
-              <a:t>Mediator</a:t>
-            </a:r>
-            <a:endParaRPr lang="en-US" dirty="0">
-              <a:latin typeface="微软雅黑" panose="020B0503020204020204" pitchFamily="34" charset="-122"/>
-              <a:ea typeface="微软雅黑" panose="020B0503020204020204" pitchFamily="34" charset="-122"/>
-            </a:endParaRPr>
-          </a:p>
-        </p:txBody>
-      </p:sp>
-      <p:sp>
-        <p:nvSpPr>
-          <p:cNvPr id="14" name="内容占位符 13"/>
-          <p:cNvSpPr>
-            <a:spLocks noGrp="1"/>
-          </p:cNvSpPr>
-          <p:nvPr>
-            <p:ph idx="1"/>
-          </p:nvPr>
-        </p:nvSpPr>
-        <p:spPr>
-          <a:xfrm>
-            <a:off x="828675" y="1600200"/>
-            <a:ext cx="7510992" cy="2764978"/>
-          </a:xfrm>
-        </p:spPr>
-        <p:txBody>
-          <a:bodyPr rtlCol="0">
-            <a:normAutofit/>
-          </a:bodyPr>
-          <a:lstStyle/>
-          <a:p>
-            <a:pPr>
-              <a:spcBef>
-                <a:spcPts val="600"/>
-              </a:spcBef>
-            </a:pPr>
-            <a:r>
-              <a:rPr lang="en-US" sz="1800" dirty="0"/>
-              <a:t>The main point of the mediator pattern is to abstract the details of interactions between all objects into a single class, called Mediator, as shown in Figure 5. Each object is still responsible for providing the original design of the service, but there is no direct interaction between the objects. The interaction between the objects is done through the Mediator class. </a:t>
-            </a:r>
-          </a:p>
-          <a:p>
-            <a:pPr>
-              <a:spcBef>
-                <a:spcPts val="600"/>
-              </a:spcBef>
-            </a:pPr>
-            <a:r>
-              <a:rPr lang="en-US" sz="1800" dirty="0"/>
-              <a:t>For example, object B calls a method of Mediator, and in this method will call some of the methods in objects E, F, and G, and it may also call B's method in reverse. Object B may not know at all which object was called.</a:t>
-            </a:r>
-          </a:p>
-        </p:txBody>
-      </p:sp>
-      <p:pic>
-        <p:nvPicPr>
-          <p:cNvPr id="2" name="图片 1" descr="屏幕快照 2018-03-24 下午9.34.28.png"/>
-          <p:cNvPicPr>
-            <a:picLocks noChangeAspect="1"/>
-          </p:cNvPicPr>
-          <p:nvPr/>
-        </p:nvPicPr>
-        <p:blipFill>
-          <a:blip r:embed="rId2">
-            <a:extLst>
-              <a:ext uri="{28A0092B-C50C-407E-A947-70E740481C1C}">
-                <a14:useLocalDpi xmlns:a14="http://schemas.microsoft.com/office/drawing/2010/main" val="0"/>
-              </a:ext>
-            </a:extLst>
-          </a:blip>
-          <a:stretch>
-            <a:fillRect/>
-          </a:stretch>
-        </p:blipFill>
-        <p:spPr>
-          <a:xfrm>
-            <a:off x="3839349" y="4221574"/>
-            <a:ext cx="5021456" cy="2392520"/>
-          </a:xfrm>
-          <a:prstGeom prst="rect">
-            <a:avLst/>
-          </a:prstGeom>
-        </p:spPr>
-      </p:pic>
-      <p:sp>
-        <p:nvSpPr>
-          <p:cNvPr id="3" name="文本框 2"/>
-          <p:cNvSpPr txBox="1"/>
-          <p:nvPr/>
-        </p:nvSpPr>
-        <p:spPr>
-          <a:xfrm>
-            <a:off x="2248135" y="5664510"/>
-            <a:ext cx="843287" cy="307777"/>
-          </a:xfrm>
-          <a:prstGeom prst="rect">
-            <a:avLst/>
-          </a:prstGeom>
-          <a:noFill/>
-        </p:spPr>
-        <p:txBody>
-          <a:bodyPr wrap="none" rtlCol="0">
-            <a:spAutoFit/>
-          </a:bodyPr>
-          <a:lstStyle/>
-          <a:p>
-            <a:r>
-              <a:rPr kumimoji="1" lang="en-US" altLang="zh-CN" sz="1400" dirty="0"/>
-              <a:t>Figure 5</a:t>
             </a:r>
             <a:endParaRPr kumimoji="1" lang="zh-CN" altLang="en-US" sz="1400" dirty="0"/>
           </a:p>
@@ -15153,6 +15310,180 @@
         </p:nvSpPr>
         <p:spPr>
           <a:xfrm>
+            <a:off x="828675" y="1600200"/>
+            <a:ext cx="7510992" cy="2764978"/>
+          </a:xfrm>
+        </p:spPr>
+        <p:txBody>
+          <a:bodyPr rtlCol="0">
+            <a:normAutofit/>
+          </a:bodyPr>
+          <a:lstStyle/>
+          <a:p>
+            <a:pPr>
+              <a:spcBef>
+                <a:spcPts val="600"/>
+              </a:spcBef>
+            </a:pPr>
+            <a:r>
+              <a:rPr lang="en-US" sz="1800" dirty="0"/>
+              <a:t>The main point of the mediator pattern is to abstract the details of interactions between all objects into a single class, called Mediator, as shown in Figure 5. Each object is still responsible for providing the original design of the service, but there is no direct interaction between the objects. The interaction between the objects is done through the Mediator class. </a:t>
+            </a:r>
+          </a:p>
+          <a:p>
+            <a:pPr>
+              <a:spcBef>
+                <a:spcPts val="600"/>
+              </a:spcBef>
+            </a:pPr>
+            <a:r>
+              <a:rPr lang="en-US" sz="1800" dirty="0"/>
+              <a:t>For example, object B calls a method of Mediator, and in this method will call some of the methods in objects E, F, and G, and it may also call B's method in reverse. Object B may not know at all which object was called.</a:t>
+            </a:r>
+          </a:p>
+        </p:txBody>
+      </p:sp>
+      <p:pic>
+        <p:nvPicPr>
+          <p:cNvPr id="2" name="图片 1" descr="屏幕快照 2018-03-24 下午9.34.28.png"/>
+          <p:cNvPicPr>
+            <a:picLocks noChangeAspect="1"/>
+          </p:cNvPicPr>
+          <p:nvPr/>
+        </p:nvPicPr>
+        <p:blipFill>
+          <a:blip r:embed="rId2">
+            <a:extLst>
+              <a:ext uri="{28A0092B-C50C-407E-A947-70E740481C1C}">
+                <a14:useLocalDpi xmlns:a14="http://schemas.microsoft.com/office/drawing/2010/main" val="0"/>
+              </a:ext>
+            </a:extLst>
+          </a:blip>
+          <a:stretch>
+            <a:fillRect/>
+          </a:stretch>
+        </p:blipFill>
+        <p:spPr>
+          <a:xfrm>
+            <a:off x="3839349" y="4221574"/>
+            <a:ext cx="5021456" cy="2392520"/>
+          </a:xfrm>
+          <a:prstGeom prst="rect">
+            <a:avLst/>
+          </a:prstGeom>
+        </p:spPr>
+      </p:pic>
+      <p:sp>
+        <p:nvSpPr>
+          <p:cNvPr id="3" name="文本框 2"/>
+          <p:cNvSpPr txBox="1"/>
+          <p:nvPr/>
+        </p:nvSpPr>
+        <p:spPr>
+          <a:xfrm>
+            <a:off x="2248135" y="5664510"/>
+            <a:ext cx="843287" cy="307777"/>
+          </a:xfrm>
+          <a:prstGeom prst="rect">
+            <a:avLst/>
+          </a:prstGeom>
+          <a:noFill/>
+        </p:spPr>
+        <p:txBody>
+          <a:bodyPr wrap="none" rtlCol="0">
+            <a:spAutoFit/>
+          </a:bodyPr>
+          <a:lstStyle/>
+          <a:p>
+            <a:r>
+              <a:rPr kumimoji="1" lang="en-US" altLang="zh-CN" sz="1400" dirty="0"/>
+              <a:t>Figure 5</a:t>
+            </a:r>
+            <a:endParaRPr kumimoji="1" lang="zh-CN" altLang="en-US" sz="1400" dirty="0"/>
+          </a:p>
+        </p:txBody>
+      </p:sp>
+    </p:spTree>
+    <p:extLst>
+      <p:ext uri="{BB962C8B-B14F-4D97-AF65-F5344CB8AC3E}">
+        <p14:creationId xmlns:p14="http://schemas.microsoft.com/office/powerpoint/2010/main" val="3108725272"/>
+      </p:ext>
+    </p:extLst>
+  </p:cSld>
+  <p:clrMapOvr>
+    <a:masterClrMapping/>
+  </p:clrMapOvr>
+  <mc:AlternateContent xmlns:mc="http://schemas.openxmlformats.org/markup-compatibility/2006" xmlns:p14="http://schemas.microsoft.com/office/powerpoint/2010/main">
+    <mc:Choice Requires="p14">
+      <p:transition spd="med" p14:dur="700">
+        <p:fade/>
+      </p:transition>
+    </mc:Choice>
+    <mc:Fallback xmlns="">
+      <p:transition spd="med">
+        <p:fade/>
+      </p:transition>
+    </mc:Fallback>
+  </mc:AlternateContent>
+</p:sld>
+</file>
+
+<file path=ppt/slides/slide35.xml><?xml version="1.0" encoding="utf-8"?>
+<p:sld xmlns:a="http://schemas.openxmlformats.org/drawingml/2006/main" xmlns:r="http://schemas.openxmlformats.org/officeDocument/2006/relationships" xmlns:p="http://schemas.openxmlformats.org/presentationml/2006/main">
+  <p:cSld>
+    <p:spTree>
+      <p:nvGrpSpPr>
+        <p:cNvPr id="1" name=""/>
+        <p:cNvGrpSpPr/>
+        <p:nvPr/>
+      </p:nvGrpSpPr>
+      <p:grpSpPr>
+        <a:xfrm>
+          <a:off x="0" y="0"/>
+          <a:ext cx="0" cy="0"/>
+          <a:chOff x="0" y="0"/>
+          <a:chExt cx="0" cy="0"/>
+        </a:xfrm>
+      </p:grpSpPr>
+      <p:sp>
+        <p:nvSpPr>
+          <p:cNvPr id="13" name="标题 12"/>
+          <p:cNvSpPr>
+            <a:spLocks noGrp="1"/>
+          </p:cNvSpPr>
+          <p:nvPr>
+            <p:ph type="title"/>
+          </p:nvPr>
+        </p:nvSpPr>
+        <p:spPr/>
+        <p:txBody>
+          <a:bodyPr rtlCol="0"/>
+          <a:lstStyle/>
+          <a:p>
+            <a:pPr rtl="0"/>
+            <a:r>
+              <a:rPr lang="en-US" altLang="zh-CN" dirty="0"/>
+              <a:t>Mediator</a:t>
+            </a:r>
+            <a:endParaRPr lang="en-US" dirty="0">
+              <a:latin typeface="微软雅黑" panose="020B0503020204020204" pitchFamily="34" charset="-122"/>
+              <a:ea typeface="微软雅黑" panose="020B0503020204020204" pitchFamily="34" charset="-122"/>
+            </a:endParaRPr>
+          </a:p>
+        </p:txBody>
+      </p:sp>
+      <p:sp>
+        <p:nvSpPr>
+          <p:cNvPr id="14" name="内容占位符 13"/>
+          <p:cNvSpPr>
+            <a:spLocks noGrp="1"/>
+          </p:cNvSpPr>
+          <p:nvPr>
+            <p:ph idx="1"/>
+          </p:nvPr>
+        </p:nvSpPr>
+        <p:spPr>
+          <a:xfrm>
             <a:off x="828675" y="1600199"/>
             <a:ext cx="7510992" cy="3217555"/>
           </a:xfrm>
@@ -15294,7 +15625,7 @@
 </p:sld>
 </file>
 
-<file path=ppt/slides/slide35.xml><?xml version="1.0" encoding="utf-8"?>
+<file path=ppt/slides/slide36.xml><?xml version="1.0" encoding="utf-8"?>
 <p:sld xmlns:a="http://schemas.openxmlformats.org/drawingml/2006/main" xmlns:r="http://schemas.openxmlformats.org/officeDocument/2006/relationships" xmlns:p="http://schemas.openxmlformats.org/presentationml/2006/main">
   <p:cSld>
     <p:spTree>
@@ -15521,645 +15852,6 @@
 </p:sld>
 </file>
 
-<file path=ppt/slides/slide36.xml><?xml version="1.0" encoding="utf-8"?>
-<p:sld xmlns:a="http://schemas.openxmlformats.org/drawingml/2006/main" xmlns:r="http://schemas.openxmlformats.org/officeDocument/2006/relationships" xmlns:p="http://schemas.openxmlformats.org/presentationml/2006/main">
-  <p:cSld>
-    <p:spTree>
-      <p:nvGrpSpPr>
-        <p:cNvPr id="1" name=""/>
-        <p:cNvGrpSpPr/>
-        <p:nvPr/>
-      </p:nvGrpSpPr>
-      <p:grpSpPr>
-        <a:xfrm>
-          <a:off x="0" y="0"/>
-          <a:ext cx="0" cy="0"/>
-          <a:chOff x="0" y="0"/>
-          <a:chExt cx="0" cy="0"/>
-        </a:xfrm>
-      </p:grpSpPr>
-      <p:sp>
-        <p:nvSpPr>
-          <p:cNvPr id="13" name="标题 12"/>
-          <p:cNvSpPr>
-            <a:spLocks noGrp="1"/>
-          </p:cNvSpPr>
-          <p:nvPr>
-            <p:ph type="title"/>
-          </p:nvPr>
-        </p:nvSpPr>
-        <p:spPr/>
-        <p:txBody>
-          <a:bodyPr rtlCol="0"/>
-          <a:lstStyle/>
-          <a:p>
-            <a:pPr rtl="0"/>
-            <a:r>
-              <a:rPr lang="en-US" altLang="zh-CN" dirty="0"/>
-              <a:t>Mediator—Applicability</a:t>
-            </a:r>
-            <a:endParaRPr lang="en-US" dirty="0">
-              <a:latin typeface="微软雅黑" panose="020B0503020204020204" pitchFamily="34" charset="-122"/>
-              <a:ea typeface="微软雅黑" panose="020B0503020204020204" pitchFamily="34" charset="-122"/>
-            </a:endParaRPr>
-          </a:p>
-        </p:txBody>
-      </p:sp>
-      <p:sp>
-        <p:nvSpPr>
-          <p:cNvPr id="14" name="内容占位符 13"/>
-          <p:cNvSpPr>
-            <a:spLocks noGrp="1"/>
-          </p:cNvSpPr>
-          <p:nvPr>
-            <p:ph idx="1"/>
-          </p:nvPr>
-        </p:nvSpPr>
-        <p:spPr>
-          <a:xfrm>
-            <a:off x="828675" y="1600199"/>
-            <a:ext cx="7510992" cy="4538133"/>
-          </a:xfrm>
-        </p:spPr>
-        <p:txBody>
-          <a:bodyPr rtlCol="0">
-            <a:normAutofit/>
-          </a:bodyPr>
-          <a:lstStyle/>
-          <a:p>
-            <a:pPr marL="0" indent="0">
-              <a:buNone/>
-            </a:pPr>
-            <a:r>
-              <a:rPr lang="en-US" altLang="zh-CN" dirty="0"/>
-              <a:t>Use</a:t>
-            </a:r>
-            <a:r>
-              <a:rPr lang="zh-CN" altLang="en-US" dirty="0"/>
-              <a:t> </a:t>
-            </a:r>
-            <a:r>
-              <a:rPr lang="en-US" altLang="zh-CN" dirty="0"/>
-              <a:t>the</a:t>
-            </a:r>
-            <a:r>
-              <a:rPr lang="zh-CN" altLang="en-US" dirty="0"/>
-              <a:t> </a:t>
-            </a:r>
-            <a:r>
-              <a:rPr lang="en-US" altLang="zh-CN" dirty="0"/>
-              <a:t>Mediator</a:t>
-            </a:r>
-            <a:r>
-              <a:rPr lang="zh-CN" altLang="en-US" dirty="0"/>
-              <a:t> </a:t>
-            </a:r>
-            <a:r>
-              <a:rPr lang="en-US" altLang="zh-CN" dirty="0"/>
-              <a:t>pattern</a:t>
-            </a:r>
-            <a:r>
-              <a:rPr lang="zh-CN" altLang="en-US" dirty="0"/>
-              <a:t> </a:t>
-            </a:r>
-            <a:r>
-              <a:rPr lang="en-US" altLang="zh-CN" dirty="0"/>
-              <a:t>when</a:t>
-            </a:r>
-          </a:p>
-          <a:p>
-            <a:r>
-              <a:rPr lang="en-US" altLang="zh-CN" dirty="0">
-                <a:latin typeface="微软雅黑" panose="020B0503020204020204" pitchFamily="34" charset="-122"/>
-                <a:ea typeface="微软雅黑" panose="020B0503020204020204" pitchFamily="34" charset="-122"/>
-              </a:rPr>
-              <a:t>A</a:t>
-            </a:r>
-            <a:r>
-              <a:rPr lang="zh-CN" altLang="en-US" dirty="0">
-                <a:latin typeface="微软雅黑" panose="020B0503020204020204" pitchFamily="34" charset="-122"/>
-                <a:ea typeface="微软雅黑" panose="020B0503020204020204" pitchFamily="34" charset="-122"/>
-              </a:rPr>
-              <a:t> </a:t>
-            </a:r>
-            <a:r>
-              <a:rPr lang="en-US" altLang="zh-CN" dirty="0">
-                <a:latin typeface="微软雅黑" panose="020B0503020204020204" pitchFamily="34" charset="-122"/>
-                <a:ea typeface="微软雅黑" panose="020B0503020204020204" pitchFamily="34" charset="-122"/>
-              </a:rPr>
-              <a:t>set</a:t>
-            </a:r>
-            <a:r>
-              <a:rPr lang="zh-CN" altLang="en-US" dirty="0">
-                <a:latin typeface="微软雅黑" panose="020B0503020204020204" pitchFamily="34" charset="-122"/>
-                <a:ea typeface="微软雅黑" panose="020B0503020204020204" pitchFamily="34" charset="-122"/>
-              </a:rPr>
-              <a:t> </a:t>
-            </a:r>
-            <a:r>
-              <a:rPr lang="zh-CN" altLang="zh-CN" dirty="0"/>
-              <a:t>o</a:t>
-            </a:r>
-            <a:r>
-              <a:rPr lang="en-US" altLang="zh-CN" dirty="0"/>
-              <a:t>f</a:t>
-            </a:r>
-            <a:r>
-              <a:rPr lang="zh-CN" altLang="en-US" dirty="0"/>
-              <a:t> </a:t>
-            </a:r>
-            <a:r>
-              <a:rPr lang="en-US" altLang="zh-CN" dirty="0"/>
-              <a:t>objects</a:t>
-            </a:r>
-            <a:r>
-              <a:rPr lang="zh-CN" altLang="en-US" dirty="0"/>
-              <a:t> </a:t>
-            </a:r>
-            <a:r>
-              <a:rPr lang="en-US" altLang="zh-CN" dirty="0"/>
-              <a:t>communicate</a:t>
-            </a:r>
-            <a:r>
-              <a:rPr lang="zh-CN" altLang="en-US" dirty="0"/>
-              <a:t> </a:t>
-            </a:r>
-            <a:r>
-              <a:rPr lang="en-US" altLang="zh-CN" dirty="0"/>
-              <a:t>in</a:t>
-            </a:r>
-            <a:r>
-              <a:rPr lang="zh-CN" altLang="en-US" dirty="0"/>
-              <a:t> </a:t>
-            </a:r>
-            <a:r>
-              <a:rPr lang="en-US" altLang="zh-CN" dirty="0"/>
-              <a:t>well-defines</a:t>
-            </a:r>
-            <a:r>
-              <a:rPr lang="zh-CN" altLang="en-US" dirty="0"/>
-              <a:t> </a:t>
-            </a:r>
-            <a:r>
-              <a:rPr lang="en-US" altLang="zh-CN" dirty="0"/>
-              <a:t>but</a:t>
-            </a:r>
-            <a:r>
-              <a:rPr lang="zh-CN" altLang="en-US" dirty="0"/>
-              <a:t> </a:t>
-            </a:r>
-            <a:r>
-              <a:rPr lang="en-US" altLang="zh-CN" dirty="0"/>
-              <a:t>complex</a:t>
-            </a:r>
-            <a:r>
-              <a:rPr lang="zh-CN" altLang="en-US" dirty="0"/>
-              <a:t> </a:t>
-            </a:r>
-            <a:r>
-              <a:rPr lang="zh-CN" altLang="zh-CN" dirty="0"/>
-              <a:t>w</a:t>
-            </a:r>
-            <a:r>
-              <a:rPr lang="en-US" altLang="zh-CN" dirty="0" err="1"/>
-              <a:t>ays</a:t>
-            </a:r>
-            <a:r>
-              <a:rPr lang="en-US" altLang="zh-CN" dirty="0"/>
-              <a:t>.</a:t>
-            </a:r>
-            <a:r>
-              <a:rPr lang="zh-CN" altLang="en-US" dirty="0"/>
-              <a:t> </a:t>
-            </a:r>
-            <a:r>
-              <a:rPr lang="en-US" altLang="zh-CN" dirty="0"/>
-              <a:t>The</a:t>
-            </a:r>
-            <a:r>
-              <a:rPr lang="zh-CN" altLang="en-US" dirty="0"/>
-              <a:t> </a:t>
-            </a:r>
-            <a:r>
-              <a:rPr lang="en-US" altLang="zh-CN" dirty="0"/>
-              <a:t>resulting</a:t>
-            </a:r>
-            <a:r>
-              <a:rPr lang="zh-CN" altLang="en-US" dirty="0"/>
-              <a:t> </a:t>
-            </a:r>
-            <a:r>
-              <a:rPr lang="en-US" altLang="zh-CN" dirty="0"/>
-              <a:t>interdependencies</a:t>
-            </a:r>
-            <a:r>
-              <a:rPr lang="zh-CN" altLang="en-US" dirty="0"/>
-              <a:t> </a:t>
-            </a:r>
-            <a:r>
-              <a:rPr lang="en-US" altLang="zh-CN" dirty="0"/>
-              <a:t>are</a:t>
-            </a:r>
-            <a:r>
-              <a:rPr lang="zh-CN" altLang="en-US" dirty="0"/>
-              <a:t> </a:t>
-            </a:r>
-            <a:r>
-              <a:rPr lang="en-US" altLang="zh-CN" dirty="0"/>
-              <a:t>unstructured</a:t>
-            </a:r>
-            <a:r>
-              <a:rPr lang="zh-CN" altLang="en-US" dirty="0"/>
-              <a:t> </a:t>
-            </a:r>
-            <a:r>
-              <a:rPr lang="en-US" altLang="zh-CN" dirty="0"/>
-              <a:t>and</a:t>
-            </a:r>
-            <a:r>
-              <a:rPr lang="zh-CN" altLang="en-US" dirty="0"/>
-              <a:t> </a:t>
-            </a:r>
-            <a:r>
-              <a:rPr lang="en-US" altLang="zh-CN" dirty="0"/>
-              <a:t>difficult</a:t>
-            </a:r>
-            <a:r>
-              <a:rPr lang="zh-CN" altLang="en-US" dirty="0"/>
-              <a:t> </a:t>
-            </a:r>
-            <a:r>
-              <a:rPr lang="en-US" altLang="zh-CN" dirty="0"/>
-              <a:t>t</a:t>
-            </a:r>
-            <a:r>
-              <a:rPr lang="zh-CN" altLang="en-US" dirty="0"/>
-              <a:t>o </a:t>
-            </a:r>
-            <a:r>
-              <a:rPr lang="en-US" altLang="zh-CN" dirty="0"/>
-              <a:t>understand.</a:t>
-            </a:r>
-          </a:p>
-          <a:p>
-            <a:r>
-              <a:rPr lang="en-US" altLang="zh-CN" dirty="0">
-                <a:latin typeface="微软雅黑" panose="020B0503020204020204" pitchFamily="34" charset="-122"/>
-                <a:ea typeface="微软雅黑" panose="020B0503020204020204" pitchFamily="34" charset="-122"/>
-              </a:rPr>
-              <a:t>Reusing</a:t>
-            </a:r>
-            <a:r>
-              <a:rPr lang="zh-CN" altLang="en-US" dirty="0">
-                <a:latin typeface="微软雅黑" panose="020B0503020204020204" pitchFamily="34" charset="-122"/>
-                <a:ea typeface="微软雅黑" panose="020B0503020204020204" pitchFamily="34" charset="-122"/>
-              </a:rPr>
-              <a:t> </a:t>
-            </a:r>
-            <a:r>
-              <a:rPr lang="en-US" altLang="zh-CN" dirty="0">
-                <a:latin typeface="微软雅黑" panose="020B0503020204020204" pitchFamily="34" charset="-122"/>
-                <a:ea typeface="微软雅黑" panose="020B0503020204020204" pitchFamily="34" charset="-122"/>
-              </a:rPr>
-              <a:t>an</a:t>
-            </a:r>
-            <a:r>
-              <a:rPr lang="zh-CN" altLang="en-US" dirty="0">
-                <a:latin typeface="微软雅黑" panose="020B0503020204020204" pitchFamily="34" charset="-122"/>
-                <a:ea typeface="微软雅黑" panose="020B0503020204020204" pitchFamily="34" charset="-122"/>
-              </a:rPr>
-              <a:t> </a:t>
-            </a:r>
-            <a:r>
-              <a:rPr lang="en-US" altLang="zh-CN" dirty="0">
-                <a:latin typeface="微软雅黑" panose="020B0503020204020204" pitchFamily="34" charset="-122"/>
-                <a:ea typeface="微软雅黑" panose="020B0503020204020204" pitchFamily="34" charset="-122"/>
-              </a:rPr>
-              <a:t>object</a:t>
-            </a:r>
-            <a:r>
-              <a:rPr lang="zh-CN" altLang="en-US" dirty="0">
-                <a:latin typeface="微软雅黑" panose="020B0503020204020204" pitchFamily="34" charset="-122"/>
-                <a:ea typeface="微软雅黑" panose="020B0503020204020204" pitchFamily="34" charset="-122"/>
-              </a:rPr>
-              <a:t> </a:t>
-            </a:r>
-            <a:r>
-              <a:rPr lang="en-US" altLang="zh-CN" dirty="0">
-                <a:latin typeface="微软雅黑" panose="020B0503020204020204" pitchFamily="34" charset="-122"/>
-                <a:ea typeface="微软雅黑" panose="020B0503020204020204" pitchFamily="34" charset="-122"/>
-              </a:rPr>
-              <a:t>is</a:t>
-            </a:r>
-            <a:r>
-              <a:rPr lang="zh-CN" altLang="en-US" dirty="0">
-                <a:latin typeface="微软雅黑" panose="020B0503020204020204" pitchFamily="34" charset="-122"/>
-                <a:ea typeface="微软雅黑" panose="020B0503020204020204" pitchFamily="34" charset="-122"/>
-              </a:rPr>
-              <a:t> </a:t>
-            </a:r>
-            <a:r>
-              <a:rPr lang="en-US" altLang="zh-CN" dirty="0">
-                <a:latin typeface="微软雅黑" panose="020B0503020204020204" pitchFamily="34" charset="-122"/>
-                <a:ea typeface="微软雅黑" panose="020B0503020204020204" pitchFamily="34" charset="-122"/>
-              </a:rPr>
-              <a:t>difficult</a:t>
-            </a:r>
-            <a:r>
-              <a:rPr lang="zh-CN" altLang="en-US" dirty="0">
-                <a:latin typeface="微软雅黑" panose="020B0503020204020204" pitchFamily="34" charset="-122"/>
-                <a:ea typeface="微软雅黑" panose="020B0503020204020204" pitchFamily="34" charset="-122"/>
-              </a:rPr>
-              <a:t> </a:t>
-            </a:r>
-            <a:r>
-              <a:rPr lang="en-US" altLang="zh-CN" dirty="0">
-                <a:latin typeface="微软雅黑" panose="020B0503020204020204" pitchFamily="34" charset="-122"/>
-                <a:ea typeface="微软雅黑" panose="020B0503020204020204" pitchFamily="34" charset="-122"/>
-              </a:rPr>
-              <a:t>because</a:t>
-            </a:r>
-            <a:r>
-              <a:rPr lang="zh-CN" altLang="en-US" dirty="0">
-                <a:latin typeface="微软雅黑" panose="020B0503020204020204" pitchFamily="34" charset="-122"/>
-                <a:ea typeface="微软雅黑" panose="020B0503020204020204" pitchFamily="34" charset="-122"/>
-              </a:rPr>
-              <a:t> </a:t>
-            </a:r>
-            <a:r>
-              <a:rPr lang="en-US" altLang="zh-CN" dirty="0">
-                <a:latin typeface="微软雅黑" panose="020B0503020204020204" pitchFamily="34" charset="-122"/>
-                <a:ea typeface="微软雅黑" panose="020B0503020204020204" pitchFamily="34" charset="-122"/>
-              </a:rPr>
-              <a:t>it</a:t>
-            </a:r>
-            <a:r>
-              <a:rPr lang="zh-CN" altLang="en-US" dirty="0">
-                <a:latin typeface="微软雅黑" panose="020B0503020204020204" pitchFamily="34" charset="-122"/>
-                <a:ea typeface="微软雅黑" panose="020B0503020204020204" pitchFamily="34" charset="-122"/>
-              </a:rPr>
-              <a:t> </a:t>
-            </a:r>
-            <a:r>
-              <a:rPr lang="en-US" altLang="zh-CN" dirty="0">
-                <a:latin typeface="微软雅黑" panose="020B0503020204020204" pitchFamily="34" charset="-122"/>
-                <a:ea typeface="微软雅黑" panose="020B0503020204020204" pitchFamily="34" charset="-122"/>
-              </a:rPr>
-              <a:t>refers</a:t>
-            </a:r>
-            <a:r>
-              <a:rPr lang="zh-CN" altLang="en-US" dirty="0">
-                <a:latin typeface="微软雅黑" panose="020B0503020204020204" pitchFamily="34" charset="-122"/>
-                <a:ea typeface="微软雅黑" panose="020B0503020204020204" pitchFamily="34" charset="-122"/>
-              </a:rPr>
-              <a:t> </a:t>
-            </a:r>
-            <a:r>
-              <a:rPr lang="en-US" altLang="zh-CN" dirty="0">
-                <a:latin typeface="微软雅黑" panose="020B0503020204020204" pitchFamily="34" charset="-122"/>
-                <a:ea typeface="微软雅黑" panose="020B0503020204020204" pitchFamily="34" charset="-122"/>
-              </a:rPr>
-              <a:t>to</a:t>
-            </a:r>
-            <a:r>
-              <a:rPr lang="zh-CN" altLang="en-US" dirty="0">
-                <a:latin typeface="微软雅黑" panose="020B0503020204020204" pitchFamily="34" charset="-122"/>
-                <a:ea typeface="微软雅黑" panose="020B0503020204020204" pitchFamily="34" charset="-122"/>
-              </a:rPr>
-              <a:t> </a:t>
-            </a:r>
-            <a:r>
-              <a:rPr lang="en-US" altLang="zh-CN" dirty="0">
-                <a:latin typeface="微软雅黑" panose="020B0503020204020204" pitchFamily="34" charset="-122"/>
-                <a:ea typeface="微软雅黑" panose="020B0503020204020204" pitchFamily="34" charset="-122"/>
-              </a:rPr>
-              <a:t>and</a:t>
-            </a:r>
-            <a:r>
-              <a:rPr lang="zh-CN" altLang="en-US" dirty="0">
-                <a:latin typeface="微软雅黑" panose="020B0503020204020204" pitchFamily="34" charset="-122"/>
-                <a:ea typeface="微软雅黑" panose="020B0503020204020204" pitchFamily="34" charset="-122"/>
-              </a:rPr>
-              <a:t> </a:t>
-            </a:r>
-            <a:r>
-              <a:rPr lang="en-US" altLang="zh-CN" dirty="0">
-                <a:latin typeface="微软雅黑" panose="020B0503020204020204" pitchFamily="34" charset="-122"/>
-                <a:ea typeface="微软雅黑" panose="020B0503020204020204" pitchFamily="34" charset="-122"/>
-              </a:rPr>
-              <a:t>communicates</a:t>
-            </a:r>
-            <a:r>
-              <a:rPr lang="zh-CN" altLang="en-US" dirty="0">
-                <a:latin typeface="微软雅黑" panose="020B0503020204020204" pitchFamily="34" charset="-122"/>
-                <a:ea typeface="微软雅黑" panose="020B0503020204020204" pitchFamily="34" charset="-122"/>
-              </a:rPr>
-              <a:t> </a:t>
-            </a:r>
-            <a:r>
-              <a:rPr lang="en-US" altLang="zh-CN" dirty="0">
-                <a:latin typeface="微软雅黑" panose="020B0503020204020204" pitchFamily="34" charset="-122"/>
-                <a:ea typeface="微软雅黑" panose="020B0503020204020204" pitchFamily="34" charset="-122"/>
-              </a:rPr>
-              <a:t>with</a:t>
-            </a:r>
-            <a:r>
-              <a:rPr lang="zh-CN" altLang="en-US" dirty="0">
-                <a:latin typeface="微软雅黑" panose="020B0503020204020204" pitchFamily="34" charset="-122"/>
-                <a:ea typeface="微软雅黑" panose="020B0503020204020204" pitchFamily="34" charset="-122"/>
-              </a:rPr>
-              <a:t> </a:t>
-            </a:r>
-            <a:r>
-              <a:rPr lang="en-US" altLang="zh-CN" dirty="0">
-                <a:latin typeface="微软雅黑" panose="020B0503020204020204" pitchFamily="34" charset="-122"/>
-                <a:ea typeface="微软雅黑" panose="020B0503020204020204" pitchFamily="34" charset="-122"/>
-              </a:rPr>
-              <a:t>many</a:t>
-            </a:r>
-            <a:r>
-              <a:rPr lang="zh-CN" altLang="en-US" dirty="0">
-                <a:latin typeface="微软雅黑" panose="020B0503020204020204" pitchFamily="34" charset="-122"/>
-                <a:ea typeface="微软雅黑" panose="020B0503020204020204" pitchFamily="34" charset="-122"/>
-              </a:rPr>
-              <a:t> </a:t>
-            </a:r>
-            <a:r>
-              <a:rPr lang="zh-CN" altLang="zh-CN" dirty="0"/>
-              <a:t>o</a:t>
-            </a:r>
-            <a:r>
-              <a:rPr lang="en-US" altLang="zh-CN" dirty="0" err="1"/>
-              <a:t>ther</a:t>
-            </a:r>
-            <a:r>
-              <a:rPr lang="zh-CN" altLang="en-US"/>
-              <a:t> </a:t>
-            </a:r>
-            <a:r>
-              <a:rPr lang="en-US" altLang="zh-CN"/>
-              <a:t>objects</a:t>
-            </a:r>
-            <a:r>
-              <a:rPr lang="en-US" altLang="zh-CN" dirty="0"/>
-              <a:t>.</a:t>
-            </a:r>
-          </a:p>
-          <a:p>
-            <a:r>
-              <a:rPr lang="en-US" altLang="zh-CN" dirty="0"/>
-              <a:t>A</a:t>
-            </a:r>
-            <a:r>
-              <a:rPr lang="zh-CN" altLang="en-US" dirty="0"/>
-              <a:t> </a:t>
-            </a:r>
-            <a:r>
-              <a:rPr lang="en-US" altLang="zh-CN" dirty="0"/>
-              <a:t>behavior</a:t>
-            </a:r>
-            <a:r>
-              <a:rPr lang="zh-CN" altLang="en-US" dirty="0"/>
-              <a:t> </a:t>
-            </a:r>
-            <a:r>
-              <a:rPr lang="en-US" altLang="zh-CN" dirty="0"/>
-              <a:t>that’s</a:t>
-            </a:r>
-            <a:r>
-              <a:rPr lang="zh-CN" altLang="en-US" dirty="0"/>
-              <a:t> </a:t>
-            </a:r>
-            <a:r>
-              <a:rPr lang="en-US" altLang="zh-CN" dirty="0"/>
-              <a:t>distributed</a:t>
-            </a:r>
-            <a:r>
-              <a:rPr lang="zh-CN" altLang="en-US" dirty="0"/>
-              <a:t> </a:t>
-            </a:r>
-            <a:r>
-              <a:rPr lang="en-US" altLang="zh-CN" dirty="0"/>
-              <a:t>between</a:t>
-            </a:r>
-            <a:r>
-              <a:rPr lang="zh-CN" altLang="en-US" dirty="0"/>
-              <a:t> </a:t>
-            </a:r>
-            <a:r>
-              <a:rPr lang="en-US" altLang="zh-CN" dirty="0"/>
-              <a:t>several</a:t>
-            </a:r>
-            <a:r>
-              <a:rPr lang="zh-CN" altLang="en-US" dirty="0"/>
-              <a:t> </a:t>
-            </a:r>
-            <a:r>
-              <a:rPr lang="en-US" altLang="zh-CN" dirty="0"/>
-              <a:t>classes</a:t>
-            </a:r>
-            <a:r>
-              <a:rPr lang="zh-CN" altLang="en-US" dirty="0"/>
-              <a:t> </a:t>
-            </a:r>
-            <a:r>
-              <a:rPr lang="en-US" altLang="zh-CN" dirty="0"/>
-              <a:t>should</a:t>
-            </a:r>
-            <a:r>
-              <a:rPr lang="zh-CN" altLang="en-US" dirty="0"/>
-              <a:t> </a:t>
-            </a:r>
-            <a:r>
-              <a:rPr lang="en-US" altLang="zh-CN" dirty="0"/>
-              <a:t>be</a:t>
-            </a:r>
-            <a:r>
-              <a:rPr lang="zh-CN" altLang="en-US" dirty="0"/>
-              <a:t> </a:t>
-            </a:r>
-            <a:r>
-              <a:rPr lang="en-US" altLang="zh-CN" dirty="0"/>
-              <a:t>customizable</a:t>
-            </a:r>
-            <a:r>
-              <a:rPr lang="zh-CN" altLang="en-US" dirty="0"/>
-              <a:t> </a:t>
-            </a:r>
-            <a:r>
-              <a:rPr lang="en-US" altLang="zh-CN" dirty="0"/>
-              <a:t>without</a:t>
-            </a:r>
-            <a:r>
-              <a:rPr lang="zh-CN" altLang="en-US" dirty="0"/>
-              <a:t> </a:t>
-            </a:r>
-            <a:r>
-              <a:rPr lang="en-US" altLang="zh-CN" dirty="0"/>
-              <a:t>a</a:t>
-            </a:r>
-            <a:r>
-              <a:rPr lang="zh-CN" altLang="en-US" dirty="0"/>
-              <a:t> </a:t>
-            </a:r>
-            <a:r>
-              <a:rPr lang="en-US" altLang="zh-CN" dirty="0"/>
-              <a:t>lot</a:t>
-            </a:r>
-            <a:r>
-              <a:rPr lang="zh-CN" altLang="en-US" dirty="0"/>
-              <a:t> </a:t>
-            </a:r>
-            <a:r>
-              <a:rPr lang="en-US" altLang="zh-CN" dirty="0"/>
-              <a:t>of</a:t>
-            </a:r>
-            <a:r>
-              <a:rPr lang="zh-CN" altLang="en-US" dirty="0"/>
-              <a:t> </a:t>
-            </a:r>
-            <a:r>
-              <a:rPr lang="en-US" altLang="zh-CN" dirty="0" err="1"/>
-              <a:t>subclassing</a:t>
-            </a:r>
-            <a:r>
-              <a:rPr lang="en-US" altLang="zh-CN" dirty="0"/>
-              <a:t>.</a:t>
-            </a:r>
-          </a:p>
-          <a:p>
-            <a:endParaRPr lang="en-US" dirty="0">
-              <a:latin typeface="微软雅黑" panose="020B0503020204020204" pitchFamily="34" charset="-122"/>
-              <a:ea typeface="微软雅黑" panose="020B0503020204020204" pitchFamily="34" charset="-122"/>
-            </a:endParaRPr>
-          </a:p>
-        </p:txBody>
-      </p:sp>
-    </p:spTree>
-    <p:extLst>
-      <p:ext uri="{BB962C8B-B14F-4D97-AF65-F5344CB8AC3E}">
-        <p14:creationId xmlns:p14="http://schemas.microsoft.com/office/powerpoint/2010/main" val="81351473"/>
-      </p:ext>
-    </p:extLst>
-  </p:cSld>
-  <p:clrMapOvr>
-    <a:masterClrMapping/>
-  </p:clrMapOvr>
-  <mc:AlternateContent xmlns:mc="http://schemas.openxmlformats.org/markup-compatibility/2006" xmlns:p14="http://schemas.microsoft.com/office/powerpoint/2010/main">
-    <mc:Choice Requires="p14">
-      <p:transition spd="med" p14:dur="700">
-        <p:fade/>
-      </p:transition>
-    </mc:Choice>
-    <mc:Fallback xmlns="">
-      <p:transition spd="med">
-        <p:fade/>
-      </p:transition>
-    </mc:Fallback>
-  </mc:AlternateContent>
-</p:sld>
-</file>
-
 <file path=ppt/slides/slide37.xml><?xml version="1.0" encoding="utf-8"?>
 <p:sld xmlns:a="http://schemas.openxmlformats.org/drawingml/2006/main" xmlns:r="http://schemas.openxmlformats.org/officeDocument/2006/relationships" xmlns:p="http://schemas.openxmlformats.org/presentationml/2006/main">
   <p:cSld>
@@ -16195,6 +15887,645 @@
             <a:pPr rtl="0"/>
             <a:r>
               <a:rPr lang="en-US" altLang="zh-CN" dirty="0"/>
+              <a:t>Mediator—Applicability</a:t>
+            </a:r>
+            <a:endParaRPr lang="en-US" dirty="0">
+              <a:latin typeface="微软雅黑" panose="020B0503020204020204" pitchFamily="34" charset="-122"/>
+              <a:ea typeface="微软雅黑" panose="020B0503020204020204" pitchFamily="34" charset="-122"/>
+            </a:endParaRPr>
+          </a:p>
+        </p:txBody>
+      </p:sp>
+      <p:sp>
+        <p:nvSpPr>
+          <p:cNvPr id="14" name="内容占位符 13"/>
+          <p:cNvSpPr>
+            <a:spLocks noGrp="1"/>
+          </p:cNvSpPr>
+          <p:nvPr>
+            <p:ph idx="1"/>
+          </p:nvPr>
+        </p:nvSpPr>
+        <p:spPr>
+          <a:xfrm>
+            <a:off x="828675" y="1600199"/>
+            <a:ext cx="7510992" cy="4538133"/>
+          </a:xfrm>
+        </p:spPr>
+        <p:txBody>
+          <a:bodyPr rtlCol="0">
+            <a:normAutofit/>
+          </a:bodyPr>
+          <a:lstStyle/>
+          <a:p>
+            <a:pPr marL="0" indent="0">
+              <a:buNone/>
+            </a:pPr>
+            <a:r>
+              <a:rPr lang="en-US" altLang="zh-CN" dirty="0"/>
+              <a:t>Use</a:t>
+            </a:r>
+            <a:r>
+              <a:rPr lang="zh-CN" altLang="en-US" dirty="0"/>
+              <a:t> </a:t>
+            </a:r>
+            <a:r>
+              <a:rPr lang="en-US" altLang="zh-CN" dirty="0"/>
+              <a:t>the</a:t>
+            </a:r>
+            <a:r>
+              <a:rPr lang="zh-CN" altLang="en-US" dirty="0"/>
+              <a:t> </a:t>
+            </a:r>
+            <a:r>
+              <a:rPr lang="en-US" altLang="zh-CN" dirty="0"/>
+              <a:t>Mediator</a:t>
+            </a:r>
+            <a:r>
+              <a:rPr lang="zh-CN" altLang="en-US" dirty="0"/>
+              <a:t> </a:t>
+            </a:r>
+            <a:r>
+              <a:rPr lang="en-US" altLang="zh-CN" dirty="0"/>
+              <a:t>pattern</a:t>
+            </a:r>
+            <a:r>
+              <a:rPr lang="zh-CN" altLang="en-US" dirty="0"/>
+              <a:t> </a:t>
+            </a:r>
+            <a:r>
+              <a:rPr lang="en-US" altLang="zh-CN" dirty="0"/>
+              <a:t>when</a:t>
+            </a:r>
+          </a:p>
+          <a:p>
+            <a:r>
+              <a:rPr lang="en-US" altLang="zh-CN" dirty="0">
+                <a:latin typeface="微软雅黑" panose="020B0503020204020204" pitchFamily="34" charset="-122"/>
+                <a:ea typeface="微软雅黑" panose="020B0503020204020204" pitchFamily="34" charset="-122"/>
+              </a:rPr>
+              <a:t>A</a:t>
+            </a:r>
+            <a:r>
+              <a:rPr lang="zh-CN" altLang="en-US" dirty="0">
+                <a:latin typeface="微软雅黑" panose="020B0503020204020204" pitchFamily="34" charset="-122"/>
+                <a:ea typeface="微软雅黑" panose="020B0503020204020204" pitchFamily="34" charset="-122"/>
+              </a:rPr>
+              <a:t> </a:t>
+            </a:r>
+            <a:r>
+              <a:rPr lang="en-US" altLang="zh-CN" dirty="0">
+                <a:latin typeface="微软雅黑" panose="020B0503020204020204" pitchFamily="34" charset="-122"/>
+                <a:ea typeface="微软雅黑" panose="020B0503020204020204" pitchFamily="34" charset="-122"/>
+              </a:rPr>
+              <a:t>set</a:t>
+            </a:r>
+            <a:r>
+              <a:rPr lang="zh-CN" altLang="en-US" dirty="0">
+                <a:latin typeface="微软雅黑" panose="020B0503020204020204" pitchFamily="34" charset="-122"/>
+                <a:ea typeface="微软雅黑" panose="020B0503020204020204" pitchFamily="34" charset="-122"/>
+              </a:rPr>
+              <a:t> </a:t>
+            </a:r>
+            <a:r>
+              <a:rPr lang="zh-CN" altLang="zh-CN" dirty="0"/>
+              <a:t>o</a:t>
+            </a:r>
+            <a:r>
+              <a:rPr lang="en-US" altLang="zh-CN" dirty="0"/>
+              <a:t>f</a:t>
+            </a:r>
+            <a:r>
+              <a:rPr lang="zh-CN" altLang="en-US" dirty="0"/>
+              <a:t> </a:t>
+            </a:r>
+            <a:r>
+              <a:rPr lang="en-US" altLang="zh-CN" dirty="0"/>
+              <a:t>objects</a:t>
+            </a:r>
+            <a:r>
+              <a:rPr lang="zh-CN" altLang="en-US" dirty="0"/>
+              <a:t> </a:t>
+            </a:r>
+            <a:r>
+              <a:rPr lang="en-US" altLang="zh-CN" dirty="0"/>
+              <a:t>communicate</a:t>
+            </a:r>
+            <a:r>
+              <a:rPr lang="zh-CN" altLang="en-US" dirty="0"/>
+              <a:t> </a:t>
+            </a:r>
+            <a:r>
+              <a:rPr lang="en-US" altLang="zh-CN" dirty="0"/>
+              <a:t>in</a:t>
+            </a:r>
+            <a:r>
+              <a:rPr lang="zh-CN" altLang="en-US" dirty="0"/>
+              <a:t> </a:t>
+            </a:r>
+            <a:r>
+              <a:rPr lang="en-US" altLang="zh-CN" dirty="0"/>
+              <a:t>well-defines</a:t>
+            </a:r>
+            <a:r>
+              <a:rPr lang="zh-CN" altLang="en-US" dirty="0"/>
+              <a:t> </a:t>
+            </a:r>
+            <a:r>
+              <a:rPr lang="en-US" altLang="zh-CN" dirty="0"/>
+              <a:t>but</a:t>
+            </a:r>
+            <a:r>
+              <a:rPr lang="zh-CN" altLang="en-US" dirty="0"/>
+              <a:t> </a:t>
+            </a:r>
+            <a:r>
+              <a:rPr lang="en-US" altLang="zh-CN" dirty="0"/>
+              <a:t>complex</a:t>
+            </a:r>
+            <a:r>
+              <a:rPr lang="zh-CN" altLang="en-US" dirty="0"/>
+              <a:t> </a:t>
+            </a:r>
+            <a:r>
+              <a:rPr lang="zh-CN" altLang="zh-CN" dirty="0"/>
+              <a:t>w</a:t>
+            </a:r>
+            <a:r>
+              <a:rPr lang="en-US" altLang="zh-CN" dirty="0" err="1"/>
+              <a:t>ays</a:t>
+            </a:r>
+            <a:r>
+              <a:rPr lang="en-US" altLang="zh-CN" dirty="0"/>
+              <a:t>.</a:t>
+            </a:r>
+            <a:r>
+              <a:rPr lang="zh-CN" altLang="en-US" dirty="0"/>
+              <a:t> </a:t>
+            </a:r>
+            <a:r>
+              <a:rPr lang="en-US" altLang="zh-CN" dirty="0"/>
+              <a:t>The</a:t>
+            </a:r>
+            <a:r>
+              <a:rPr lang="zh-CN" altLang="en-US" dirty="0"/>
+              <a:t> </a:t>
+            </a:r>
+            <a:r>
+              <a:rPr lang="en-US" altLang="zh-CN" dirty="0"/>
+              <a:t>resulting</a:t>
+            </a:r>
+            <a:r>
+              <a:rPr lang="zh-CN" altLang="en-US" dirty="0"/>
+              <a:t> </a:t>
+            </a:r>
+            <a:r>
+              <a:rPr lang="en-US" altLang="zh-CN" dirty="0"/>
+              <a:t>interdependencies</a:t>
+            </a:r>
+            <a:r>
+              <a:rPr lang="zh-CN" altLang="en-US" dirty="0"/>
+              <a:t> </a:t>
+            </a:r>
+            <a:r>
+              <a:rPr lang="en-US" altLang="zh-CN" dirty="0"/>
+              <a:t>are</a:t>
+            </a:r>
+            <a:r>
+              <a:rPr lang="zh-CN" altLang="en-US" dirty="0"/>
+              <a:t> </a:t>
+            </a:r>
+            <a:r>
+              <a:rPr lang="en-US" altLang="zh-CN" dirty="0"/>
+              <a:t>unstructured</a:t>
+            </a:r>
+            <a:r>
+              <a:rPr lang="zh-CN" altLang="en-US" dirty="0"/>
+              <a:t> </a:t>
+            </a:r>
+            <a:r>
+              <a:rPr lang="en-US" altLang="zh-CN" dirty="0"/>
+              <a:t>and</a:t>
+            </a:r>
+            <a:r>
+              <a:rPr lang="zh-CN" altLang="en-US" dirty="0"/>
+              <a:t> </a:t>
+            </a:r>
+            <a:r>
+              <a:rPr lang="en-US" altLang="zh-CN" dirty="0"/>
+              <a:t>difficult</a:t>
+            </a:r>
+            <a:r>
+              <a:rPr lang="zh-CN" altLang="en-US" dirty="0"/>
+              <a:t> </a:t>
+            </a:r>
+            <a:r>
+              <a:rPr lang="en-US" altLang="zh-CN" dirty="0"/>
+              <a:t>t</a:t>
+            </a:r>
+            <a:r>
+              <a:rPr lang="zh-CN" altLang="en-US" dirty="0"/>
+              <a:t>o </a:t>
+            </a:r>
+            <a:r>
+              <a:rPr lang="en-US" altLang="zh-CN" dirty="0"/>
+              <a:t>understand.</a:t>
+            </a:r>
+          </a:p>
+          <a:p>
+            <a:r>
+              <a:rPr lang="en-US" altLang="zh-CN" dirty="0">
+                <a:latin typeface="微软雅黑" panose="020B0503020204020204" pitchFamily="34" charset="-122"/>
+                <a:ea typeface="微软雅黑" panose="020B0503020204020204" pitchFamily="34" charset="-122"/>
+              </a:rPr>
+              <a:t>Reusing</a:t>
+            </a:r>
+            <a:r>
+              <a:rPr lang="zh-CN" altLang="en-US" dirty="0">
+                <a:latin typeface="微软雅黑" panose="020B0503020204020204" pitchFamily="34" charset="-122"/>
+                <a:ea typeface="微软雅黑" panose="020B0503020204020204" pitchFamily="34" charset="-122"/>
+              </a:rPr>
+              <a:t> </a:t>
+            </a:r>
+            <a:r>
+              <a:rPr lang="en-US" altLang="zh-CN" dirty="0">
+                <a:latin typeface="微软雅黑" panose="020B0503020204020204" pitchFamily="34" charset="-122"/>
+                <a:ea typeface="微软雅黑" panose="020B0503020204020204" pitchFamily="34" charset="-122"/>
+              </a:rPr>
+              <a:t>an</a:t>
+            </a:r>
+            <a:r>
+              <a:rPr lang="zh-CN" altLang="en-US" dirty="0">
+                <a:latin typeface="微软雅黑" panose="020B0503020204020204" pitchFamily="34" charset="-122"/>
+                <a:ea typeface="微软雅黑" panose="020B0503020204020204" pitchFamily="34" charset="-122"/>
+              </a:rPr>
+              <a:t> </a:t>
+            </a:r>
+            <a:r>
+              <a:rPr lang="en-US" altLang="zh-CN" dirty="0">
+                <a:latin typeface="微软雅黑" panose="020B0503020204020204" pitchFamily="34" charset="-122"/>
+                <a:ea typeface="微软雅黑" panose="020B0503020204020204" pitchFamily="34" charset="-122"/>
+              </a:rPr>
+              <a:t>object</a:t>
+            </a:r>
+            <a:r>
+              <a:rPr lang="zh-CN" altLang="en-US" dirty="0">
+                <a:latin typeface="微软雅黑" panose="020B0503020204020204" pitchFamily="34" charset="-122"/>
+                <a:ea typeface="微软雅黑" panose="020B0503020204020204" pitchFamily="34" charset="-122"/>
+              </a:rPr>
+              <a:t> </a:t>
+            </a:r>
+            <a:r>
+              <a:rPr lang="en-US" altLang="zh-CN" dirty="0">
+                <a:latin typeface="微软雅黑" panose="020B0503020204020204" pitchFamily="34" charset="-122"/>
+                <a:ea typeface="微软雅黑" panose="020B0503020204020204" pitchFamily="34" charset="-122"/>
+              </a:rPr>
+              <a:t>is</a:t>
+            </a:r>
+            <a:r>
+              <a:rPr lang="zh-CN" altLang="en-US" dirty="0">
+                <a:latin typeface="微软雅黑" panose="020B0503020204020204" pitchFamily="34" charset="-122"/>
+                <a:ea typeface="微软雅黑" panose="020B0503020204020204" pitchFamily="34" charset="-122"/>
+              </a:rPr>
+              <a:t> </a:t>
+            </a:r>
+            <a:r>
+              <a:rPr lang="en-US" altLang="zh-CN" dirty="0">
+                <a:latin typeface="微软雅黑" panose="020B0503020204020204" pitchFamily="34" charset="-122"/>
+                <a:ea typeface="微软雅黑" panose="020B0503020204020204" pitchFamily="34" charset="-122"/>
+              </a:rPr>
+              <a:t>difficult</a:t>
+            </a:r>
+            <a:r>
+              <a:rPr lang="zh-CN" altLang="en-US" dirty="0">
+                <a:latin typeface="微软雅黑" panose="020B0503020204020204" pitchFamily="34" charset="-122"/>
+                <a:ea typeface="微软雅黑" panose="020B0503020204020204" pitchFamily="34" charset="-122"/>
+              </a:rPr>
+              <a:t> </a:t>
+            </a:r>
+            <a:r>
+              <a:rPr lang="en-US" altLang="zh-CN" dirty="0">
+                <a:latin typeface="微软雅黑" panose="020B0503020204020204" pitchFamily="34" charset="-122"/>
+                <a:ea typeface="微软雅黑" panose="020B0503020204020204" pitchFamily="34" charset="-122"/>
+              </a:rPr>
+              <a:t>because</a:t>
+            </a:r>
+            <a:r>
+              <a:rPr lang="zh-CN" altLang="en-US" dirty="0">
+                <a:latin typeface="微软雅黑" panose="020B0503020204020204" pitchFamily="34" charset="-122"/>
+                <a:ea typeface="微软雅黑" panose="020B0503020204020204" pitchFamily="34" charset="-122"/>
+              </a:rPr>
+              <a:t> </a:t>
+            </a:r>
+            <a:r>
+              <a:rPr lang="en-US" altLang="zh-CN" dirty="0">
+                <a:latin typeface="微软雅黑" panose="020B0503020204020204" pitchFamily="34" charset="-122"/>
+                <a:ea typeface="微软雅黑" panose="020B0503020204020204" pitchFamily="34" charset="-122"/>
+              </a:rPr>
+              <a:t>it</a:t>
+            </a:r>
+            <a:r>
+              <a:rPr lang="zh-CN" altLang="en-US" dirty="0">
+                <a:latin typeface="微软雅黑" panose="020B0503020204020204" pitchFamily="34" charset="-122"/>
+                <a:ea typeface="微软雅黑" panose="020B0503020204020204" pitchFamily="34" charset="-122"/>
+              </a:rPr>
+              <a:t> </a:t>
+            </a:r>
+            <a:r>
+              <a:rPr lang="en-US" altLang="zh-CN" dirty="0">
+                <a:latin typeface="微软雅黑" panose="020B0503020204020204" pitchFamily="34" charset="-122"/>
+                <a:ea typeface="微软雅黑" panose="020B0503020204020204" pitchFamily="34" charset="-122"/>
+              </a:rPr>
+              <a:t>refers</a:t>
+            </a:r>
+            <a:r>
+              <a:rPr lang="zh-CN" altLang="en-US" dirty="0">
+                <a:latin typeface="微软雅黑" panose="020B0503020204020204" pitchFamily="34" charset="-122"/>
+                <a:ea typeface="微软雅黑" panose="020B0503020204020204" pitchFamily="34" charset="-122"/>
+              </a:rPr>
+              <a:t> </a:t>
+            </a:r>
+            <a:r>
+              <a:rPr lang="en-US" altLang="zh-CN" dirty="0">
+                <a:latin typeface="微软雅黑" panose="020B0503020204020204" pitchFamily="34" charset="-122"/>
+                <a:ea typeface="微软雅黑" panose="020B0503020204020204" pitchFamily="34" charset="-122"/>
+              </a:rPr>
+              <a:t>to</a:t>
+            </a:r>
+            <a:r>
+              <a:rPr lang="zh-CN" altLang="en-US" dirty="0">
+                <a:latin typeface="微软雅黑" panose="020B0503020204020204" pitchFamily="34" charset="-122"/>
+                <a:ea typeface="微软雅黑" panose="020B0503020204020204" pitchFamily="34" charset="-122"/>
+              </a:rPr>
+              <a:t> </a:t>
+            </a:r>
+            <a:r>
+              <a:rPr lang="en-US" altLang="zh-CN" dirty="0">
+                <a:latin typeface="微软雅黑" panose="020B0503020204020204" pitchFamily="34" charset="-122"/>
+                <a:ea typeface="微软雅黑" panose="020B0503020204020204" pitchFamily="34" charset="-122"/>
+              </a:rPr>
+              <a:t>and</a:t>
+            </a:r>
+            <a:r>
+              <a:rPr lang="zh-CN" altLang="en-US" dirty="0">
+                <a:latin typeface="微软雅黑" panose="020B0503020204020204" pitchFamily="34" charset="-122"/>
+                <a:ea typeface="微软雅黑" panose="020B0503020204020204" pitchFamily="34" charset="-122"/>
+              </a:rPr>
+              <a:t> </a:t>
+            </a:r>
+            <a:r>
+              <a:rPr lang="en-US" altLang="zh-CN" dirty="0">
+                <a:latin typeface="微软雅黑" panose="020B0503020204020204" pitchFamily="34" charset="-122"/>
+                <a:ea typeface="微软雅黑" panose="020B0503020204020204" pitchFamily="34" charset="-122"/>
+              </a:rPr>
+              <a:t>communicates</a:t>
+            </a:r>
+            <a:r>
+              <a:rPr lang="zh-CN" altLang="en-US" dirty="0">
+                <a:latin typeface="微软雅黑" panose="020B0503020204020204" pitchFamily="34" charset="-122"/>
+                <a:ea typeface="微软雅黑" panose="020B0503020204020204" pitchFamily="34" charset="-122"/>
+              </a:rPr>
+              <a:t> </a:t>
+            </a:r>
+            <a:r>
+              <a:rPr lang="en-US" altLang="zh-CN" dirty="0">
+                <a:latin typeface="微软雅黑" panose="020B0503020204020204" pitchFamily="34" charset="-122"/>
+                <a:ea typeface="微软雅黑" panose="020B0503020204020204" pitchFamily="34" charset="-122"/>
+              </a:rPr>
+              <a:t>with</a:t>
+            </a:r>
+            <a:r>
+              <a:rPr lang="zh-CN" altLang="en-US" dirty="0">
+                <a:latin typeface="微软雅黑" panose="020B0503020204020204" pitchFamily="34" charset="-122"/>
+                <a:ea typeface="微软雅黑" panose="020B0503020204020204" pitchFamily="34" charset="-122"/>
+              </a:rPr>
+              <a:t> </a:t>
+            </a:r>
+            <a:r>
+              <a:rPr lang="en-US" altLang="zh-CN" dirty="0">
+                <a:latin typeface="微软雅黑" panose="020B0503020204020204" pitchFamily="34" charset="-122"/>
+                <a:ea typeface="微软雅黑" panose="020B0503020204020204" pitchFamily="34" charset="-122"/>
+              </a:rPr>
+              <a:t>many</a:t>
+            </a:r>
+            <a:r>
+              <a:rPr lang="zh-CN" altLang="en-US" dirty="0">
+                <a:latin typeface="微软雅黑" panose="020B0503020204020204" pitchFamily="34" charset="-122"/>
+                <a:ea typeface="微软雅黑" panose="020B0503020204020204" pitchFamily="34" charset="-122"/>
+              </a:rPr>
+              <a:t> </a:t>
+            </a:r>
+            <a:r>
+              <a:rPr lang="zh-CN" altLang="zh-CN" dirty="0"/>
+              <a:t>o</a:t>
+            </a:r>
+            <a:r>
+              <a:rPr lang="en-US" altLang="zh-CN" dirty="0" err="1"/>
+              <a:t>ther</a:t>
+            </a:r>
+            <a:r>
+              <a:rPr lang="zh-CN" altLang="en-US"/>
+              <a:t> </a:t>
+            </a:r>
+            <a:r>
+              <a:rPr lang="en-US" altLang="zh-CN"/>
+              <a:t>objects</a:t>
+            </a:r>
+            <a:r>
+              <a:rPr lang="en-US" altLang="zh-CN" dirty="0"/>
+              <a:t>.</a:t>
+            </a:r>
+          </a:p>
+          <a:p>
+            <a:r>
+              <a:rPr lang="en-US" altLang="zh-CN" dirty="0"/>
+              <a:t>A</a:t>
+            </a:r>
+            <a:r>
+              <a:rPr lang="zh-CN" altLang="en-US" dirty="0"/>
+              <a:t> </a:t>
+            </a:r>
+            <a:r>
+              <a:rPr lang="en-US" altLang="zh-CN" dirty="0"/>
+              <a:t>behavior</a:t>
+            </a:r>
+            <a:r>
+              <a:rPr lang="zh-CN" altLang="en-US" dirty="0"/>
+              <a:t> </a:t>
+            </a:r>
+            <a:r>
+              <a:rPr lang="en-US" altLang="zh-CN" dirty="0"/>
+              <a:t>that’s</a:t>
+            </a:r>
+            <a:r>
+              <a:rPr lang="zh-CN" altLang="en-US" dirty="0"/>
+              <a:t> </a:t>
+            </a:r>
+            <a:r>
+              <a:rPr lang="en-US" altLang="zh-CN" dirty="0"/>
+              <a:t>distributed</a:t>
+            </a:r>
+            <a:r>
+              <a:rPr lang="zh-CN" altLang="en-US" dirty="0"/>
+              <a:t> </a:t>
+            </a:r>
+            <a:r>
+              <a:rPr lang="en-US" altLang="zh-CN" dirty="0"/>
+              <a:t>between</a:t>
+            </a:r>
+            <a:r>
+              <a:rPr lang="zh-CN" altLang="en-US" dirty="0"/>
+              <a:t> </a:t>
+            </a:r>
+            <a:r>
+              <a:rPr lang="en-US" altLang="zh-CN" dirty="0"/>
+              <a:t>several</a:t>
+            </a:r>
+            <a:r>
+              <a:rPr lang="zh-CN" altLang="en-US" dirty="0"/>
+              <a:t> </a:t>
+            </a:r>
+            <a:r>
+              <a:rPr lang="en-US" altLang="zh-CN" dirty="0"/>
+              <a:t>classes</a:t>
+            </a:r>
+            <a:r>
+              <a:rPr lang="zh-CN" altLang="en-US" dirty="0"/>
+              <a:t> </a:t>
+            </a:r>
+            <a:r>
+              <a:rPr lang="en-US" altLang="zh-CN" dirty="0"/>
+              <a:t>should</a:t>
+            </a:r>
+            <a:r>
+              <a:rPr lang="zh-CN" altLang="en-US" dirty="0"/>
+              <a:t> </a:t>
+            </a:r>
+            <a:r>
+              <a:rPr lang="en-US" altLang="zh-CN" dirty="0"/>
+              <a:t>be</a:t>
+            </a:r>
+            <a:r>
+              <a:rPr lang="zh-CN" altLang="en-US" dirty="0"/>
+              <a:t> </a:t>
+            </a:r>
+            <a:r>
+              <a:rPr lang="en-US" altLang="zh-CN" dirty="0"/>
+              <a:t>customizable</a:t>
+            </a:r>
+            <a:r>
+              <a:rPr lang="zh-CN" altLang="en-US" dirty="0"/>
+              <a:t> </a:t>
+            </a:r>
+            <a:r>
+              <a:rPr lang="en-US" altLang="zh-CN" dirty="0"/>
+              <a:t>without</a:t>
+            </a:r>
+            <a:r>
+              <a:rPr lang="zh-CN" altLang="en-US" dirty="0"/>
+              <a:t> </a:t>
+            </a:r>
+            <a:r>
+              <a:rPr lang="en-US" altLang="zh-CN" dirty="0"/>
+              <a:t>a</a:t>
+            </a:r>
+            <a:r>
+              <a:rPr lang="zh-CN" altLang="en-US" dirty="0"/>
+              <a:t> </a:t>
+            </a:r>
+            <a:r>
+              <a:rPr lang="en-US" altLang="zh-CN" dirty="0"/>
+              <a:t>lot</a:t>
+            </a:r>
+            <a:r>
+              <a:rPr lang="zh-CN" altLang="en-US" dirty="0"/>
+              <a:t> </a:t>
+            </a:r>
+            <a:r>
+              <a:rPr lang="en-US" altLang="zh-CN" dirty="0"/>
+              <a:t>of</a:t>
+            </a:r>
+            <a:r>
+              <a:rPr lang="zh-CN" altLang="en-US" dirty="0"/>
+              <a:t> </a:t>
+            </a:r>
+            <a:r>
+              <a:rPr lang="en-US" altLang="zh-CN" dirty="0" err="1"/>
+              <a:t>subclassing</a:t>
+            </a:r>
+            <a:r>
+              <a:rPr lang="en-US" altLang="zh-CN" dirty="0"/>
+              <a:t>.</a:t>
+            </a:r>
+          </a:p>
+          <a:p>
+            <a:endParaRPr lang="en-US" dirty="0">
+              <a:latin typeface="微软雅黑" panose="020B0503020204020204" pitchFamily="34" charset="-122"/>
+              <a:ea typeface="微软雅黑" panose="020B0503020204020204" pitchFamily="34" charset="-122"/>
+            </a:endParaRPr>
+          </a:p>
+        </p:txBody>
+      </p:sp>
+    </p:spTree>
+    <p:extLst>
+      <p:ext uri="{BB962C8B-B14F-4D97-AF65-F5344CB8AC3E}">
+        <p14:creationId xmlns:p14="http://schemas.microsoft.com/office/powerpoint/2010/main" val="81351473"/>
+      </p:ext>
+    </p:extLst>
+  </p:cSld>
+  <p:clrMapOvr>
+    <a:masterClrMapping/>
+  </p:clrMapOvr>
+  <mc:AlternateContent xmlns:mc="http://schemas.openxmlformats.org/markup-compatibility/2006" xmlns:p14="http://schemas.microsoft.com/office/powerpoint/2010/main">
+    <mc:Choice Requires="p14">
+      <p:transition spd="med" p14:dur="700">
+        <p:fade/>
+      </p:transition>
+    </mc:Choice>
+    <mc:Fallback xmlns="">
+      <p:transition spd="med">
+        <p:fade/>
+      </p:transition>
+    </mc:Fallback>
+  </mc:AlternateContent>
+</p:sld>
+</file>
+
+<file path=ppt/slides/slide38.xml><?xml version="1.0" encoding="utf-8"?>
+<p:sld xmlns:a="http://schemas.openxmlformats.org/drawingml/2006/main" xmlns:r="http://schemas.openxmlformats.org/officeDocument/2006/relationships" xmlns:p="http://schemas.openxmlformats.org/presentationml/2006/main">
+  <p:cSld>
+    <p:spTree>
+      <p:nvGrpSpPr>
+        <p:cNvPr id="1" name=""/>
+        <p:cNvGrpSpPr/>
+        <p:nvPr/>
+      </p:nvGrpSpPr>
+      <p:grpSpPr>
+        <a:xfrm>
+          <a:off x="0" y="0"/>
+          <a:ext cx="0" cy="0"/>
+          <a:chOff x="0" y="0"/>
+          <a:chExt cx="0" cy="0"/>
+        </a:xfrm>
+      </p:grpSpPr>
+      <p:sp>
+        <p:nvSpPr>
+          <p:cNvPr id="13" name="标题 12"/>
+          <p:cNvSpPr>
+            <a:spLocks noGrp="1"/>
+          </p:cNvSpPr>
+          <p:nvPr>
+            <p:ph type="title"/>
+          </p:nvPr>
+        </p:nvSpPr>
+        <p:spPr/>
+        <p:txBody>
+          <a:bodyPr rtlCol="0"/>
+          <a:lstStyle/>
+          <a:p>
+            <a:pPr rtl="0"/>
+            <a:r>
+              <a:rPr lang="en-US" altLang="zh-CN" dirty="0"/>
               <a:t>Mediator—Example</a:t>
             </a:r>
             <a:endParaRPr lang="en-US" dirty="0">
@@ -16326,7 +16657,7 @@
 </p:sld>
 </file>
 
-<file path=ppt/slides/slide38.xml><?xml version="1.0" encoding="utf-8"?>
+<file path=ppt/slides/slide39.xml><?xml version="1.0" encoding="utf-8"?>
 <p:sld xmlns:a="http://schemas.openxmlformats.org/drawingml/2006/main" xmlns:r="http://schemas.openxmlformats.org/officeDocument/2006/relationships" xmlns:p="http://schemas.openxmlformats.org/presentationml/2006/main">
   <p:cSld>
     <p:spTree>
@@ -16540,152 +16871,6 @@
 </p:sld>
 </file>
 
-<file path=ppt/slides/slide39.xml><?xml version="1.0" encoding="utf-8"?>
-<p:sld xmlns:a="http://schemas.openxmlformats.org/drawingml/2006/main" xmlns:r="http://schemas.openxmlformats.org/officeDocument/2006/relationships" xmlns:p="http://schemas.openxmlformats.org/presentationml/2006/main">
-  <p:cSld>
-    <p:spTree>
-      <p:nvGrpSpPr>
-        <p:cNvPr id="1" name=""/>
-        <p:cNvGrpSpPr/>
-        <p:nvPr/>
-      </p:nvGrpSpPr>
-      <p:grpSpPr>
-        <a:xfrm>
-          <a:off x="0" y="0"/>
-          <a:ext cx="0" cy="0"/>
-          <a:chOff x="0" y="0"/>
-          <a:chExt cx="0" cy="0"/>
-        </a:xfrm>
-      </p:grpSpPr>
-      <p:sp>
-        <p:nvSpPr>
-          <p:cNvPr id="13" name="标题 12"/>
-          <p:cNvSpPr>
-            <a:spLocks noGrp="1"/>
-          </p:cNvSpPr>
-          <p:nvPr>
-            <p:ph type="title"/>
-          </p:nvPr>
-        </p:nvSpPr>
-        <p:spPr/>
-        <p:txBody>
-          <a:bodyPr rtlCol="0"/>
-          <a:lstStyle/>
-          <a:p>
-            <a:pPr rtl="0"/>
-            <a:r>
-              <a:rPr lang="en-US" altLang="zh-CN" dirty="0"/>
-              <a:t>Mediator—Advantage</a:t>
-            </a:r>
-            <a:endParaRPr lang="en-US" dirty="0">
-              <a:latin typeface="微软雅黑" panose="020B0503020204020204" pitchFamily="34" charset="-122"/>
-              <a:ea typeface="微软雅黑" panose="020B0503020204020204" pitchFamily="34" charset="-122"/>
-            </a:endParaRPr>
-          </a:p>
-        </p:txBody>
-      </p:sp>
-      <p:sp>
-        <p:nvSpPr>
-          <p:cNvPr id="14" name="内容占位符 13"/>
-          <p:cNvSpPr>
-            <a:spLocks noGrp="1"/>
-          </p:cNvSpPr>
-          <p:nvPr>
-            <p:ph idx="1"/>
-          </p:nvPr>
-        </p:nvSpPr>
-        <p:spPr>
-          <a:xfrm>
-            <a:off x="828675" y="1600199"/>
-            <a:ext cx="7510992" cy="4538133"/>
-          </a:xfrm>
-        </p:spPr>
-        <p:txBody>
-          <a:bodyPr rtlCol="0">
-            <a:normAutofit/>
-          </a:bodyPr>
-          <a:lstStyle/>
-          <a:p>
-            <a:r>
-              <a:rPr lang="en-US" dirty="0"/>
-              <a:t>The interaction of all objects is transferred to a</a:t>
-            </a:r>
-            <a:r>
-              <a:rPr lang="en-US" altLang="zh-CN" dirty="0"/>
-              <a:t>n</a:t>
-            </a:r>
-            <a:r>
-              <a:rPr lang="en-US" dirty="0"/>
-              <a:t> </a:t>
-            </a:r>
-            <a:r>
-              <a:rPr lang="en-US" altLang="zh-CN" dirty="0"/>
-              <a:t>independent </a:t>
-            </a:r>
-            <a:r>
-              <a:rPr lang="en-US" dirty="0"/>
-              <a:t>mediator object, making it easier for users to modify inter-relationships between objects through mediators. When modifying an interactive behavior, it can be done by modifying or replacing one of the specific mediator subclasses. In addition, the transfer of object interactions into a specialized class also improves object reusability.</a:t>
-            </a:r>
-          </a:p>
-          <a:p>
-            <a:r>
-              <a:rPr lang="en-US" dirty="0"/>
-              <a:t>Because the objects do not interact directly, the unit test of the object </a:t>
-            </a:r>
-            <a:r>
-              <a:rPr lang="en-US" altLang="zh-CN" dirty="0"/>
-              <a:t>becomes</a:t>
-            </a:r>
-            <a:r>
-              <a:rPr lang="zh-CN" altLang="en-US" dirty="0"/>
-              <a:t> </a:t>
-            </a:r>
-            <a:r>
-              <a:rPr lang="en-US" altLang="zh-CN" dirty="0"/>
-              <a:t>more</a:t>
-            </a:r>
-            <a:r>
-              <a:rPr lang="en-US" dirty="0"/>
-              <a:t> easier.</a:t>
-            </a:r>
-          </a:p>
-          <a:p>
-            <a:r>
-              <a:rPr lang="en-US" dirty="0"/>
-              <a:t>Low coupling makes the modification of one class not affect other classes.</a:t>
-            </a:r>
-            <a:endParaRPr lang="en-US" dirty="0">
-              <a:latin typeface="微软雅黑" panose="020B0503020204020204" pitchFamily="34" charset="-122"/>
-              <a:ea typeface="微软雅黑" panose="020B0503020204020204" pitchFamily="34" charset="-122"/>
-            </a:endParaRPr>
-          </a:p>
-        </p:txBody>
-      </p:sp>
-    </p:spTree>
-    <p:extLst>
-      <p:ext uri="{BB962C8B-B14F-4D97-AF65-F5344CB8AC3E}">
-        <p14:creationId xmlns:p14="http://schemas.microsoft.com/office/powerpoint/2010/main" val="163476053"/>
-      </p:ext>
-    </p:extLst>
-  </p:cSld>
-  <p:clrMapOvr>
-    <a:masterClrMapping/>
-  </p:clrMapOvr>
-  <mc:AlternateContent xmlns:mc="http://schemas.openxmlformats.org/markup-compatibility/2006" xmlns:p14="http://schemas.microsoft.com/office/powerpoint/2010/main">
-    <mc:Choice Requires="p14">
-      <p:transition spd="med" p14:dur="700">
-        <p:fade/>
-      </p:transition>
-    </mc:Choice>
-    <mc:Fallback xmlns="">
-      <p:transition spd="med">
-        <p:fade/>
-      </p:transition>
-    </mc:Fallback>
-  </mc:AlternateContent>
-</p:sld>
-</file>
-
 <file path=ppt/slides/slide4.xml><?xml version="1.0" encoding="utf-8"?>
 <p:sld xmlns:a="http://schemas.openxmlformats.org/drawingml/2006/main" xmlns:r="http://schemas.openxmlformats.org/officeDocument/2006/relationships" xmlns:p="http://schemas.openxmlformats.org/presentationml/2006/main">
   <p:cSld>
@@ -16828,6 +17013,152 @@
     <p:extLst>
       <p:ext uri="{BB962C8B-B14F-4D97-AF65-F5344CB8AC3E}">
         <p14:creationId xmlns:p14="http://schemas.microsoft.com/office/powerpoint/2010/main" val="1474765528"/>
+      </p:ext>
+    </p:extLst>
+  </p:cSld>
+  <p:clrMapOvr>
+    <a:masterClrMapping/>
+  </p:clrMapOvr>
+  <mc:AlternateContent xmlns:mc="http://schemas.openxmlformats.org/markup-compatibility/2006" xmlns:p14="http://schemas.microsoft.com/office/powerpoint/2010/main">
+    <mc:Choice Requires="p14">
+      <p:transition spd="med" p14:dur="700">
+        <p:fade/>
+      </p:transition>
+    </mc:Choice>
+    <mc:Fallback xmlns="">
+      <p:transition spd="med">
+        <p:fade/>
+      </p:transition>
+    </mc:Fallback>
+  </mc:AlternateContent>
+</p:sld>
+</file>
+
+<file path=ppt/slides/slide40.xml><?xml version="1.0" encoding="utf-8"?>
+<p:sld xmlns:a="http://schemas.openxmlformats.org/drawingml/2006/main" xmlns:r="http://schemas.openxmlformats.org/officeDocument/2006/relationships" xmlns:p="http://schemas.openxmlformats.org/presentationml/2006/main">
+  <p:cSld>
+    <p:spTree>
+      <p:nvGrpSpPr>
+        <p:cNvPr id="1" name=""/>
+        <p:cNvGrpSpPr/>
+        <p:nvPr/>
+      </p:nvGrpSpPr>
+      <p:grpSpPr>
+        <a:xfrm>
+          <a:off x="0" y="0"/>
+          <a:ext cx="0" cy="0"/>
+          <a:chOff x="0" y="0"/>
+          <a:chExt cx="0" cy="0"/>
+        </a:xfrm>
+      </p:grpSpPr>
+      <p:sp>
+        <p:nvSpPr>
+          <p:cNvPr id="13" name="标题 12"/>
+          <p:cNvSpPr>
+            <a:spLocks noGrp="1"/>
+          </p:cNvSpPr>
+          <p:nvPr>
+            <p:ph type="title"/>
+          </p:nvPr>
+        </p:nvSpPr>
+        <p:spPr/>
+        <p:txBody>
+          <a:bodyPr rtlCol="0"/>
+          <a:lstStyle/>
+          <a:p>
+            <a:pPr rtl="0"/>
+            <a:r>
+              <a:rPr lang="en-US" altLang="zh-CN" dirty="0"/>
+              <a:t>Mediator—Advantage</a:t>
+            </a:r>
+            <a:endParaRPr lang="en-US" dirty="0">
+              <a:latin typeface="微软雅黑" panose="020B0503020204020204" pitchFamily="34" charset="-122"/>
+              <a:ea typeface="微软雅黑" panose="020B0503020204020204" pitchFamily="34" charset="-122"/>
+            </a:endParaRPr>
+          </a:p>
+        </p:txBody>
+      </p:sp>
+      <p:sp>
+        <p:nvSpPr>
+          <p:cNvPr id="14" name="内容占位符 13"/>
+          <p:cNvSpPr>
+            <a:spLocks noGrp="1"/>
+          </p:cNvSpPr>
+          <p:nvPr>
+            <p:ph idx="1"/>
+          </p:nvPr>
+        </p:nvSpPr>
+        <p:spPr>
+          <a:xfrm>
+            <a:off x="828675" y="1600199"/>
+            <a:ext cx="7510992" cy="4538133"/>
+          </a:xfrm>
+        </p:spPr>
+        <p:txBody>
+          <a:bodyPr rtlCol="0">
+            <a:normAutofit/>
+          </a:bodyPr>
+          <a:lstStyle/>
+          <a:p>
+            <a:r>
+              <a:rPr lang="en-US" dirty="0"/>
+              <a:t>The interaction of all objects is transferred to a</a:t>
+            </a:r>
+            <a:r>
+              <a:rPr lang="en-US" altLang="zh-CN" dirty="0"/>
+              <a:t>n</a:t>
+            </a:r>
+            <a:r>
+              <a:rPr lang="en-US" dirty="0"/>
+              <a:t> </a:t>
+            </a:r>
+            <a:r>
+              <a:rPr lang="en-US" altLang="zh-CN" dirty="0"/>
+              <a:t>independent </a:t>
+            </a:r>
+            <a:r>
+              <a:rPr lang="en-US" dirty="0"/>
+              <a:t>mediator object, making it easier for users to modify inter-relationships between objects through mediators. When modifying an interactive behavior, it can be done by modifying or replacing one of the specific mediator subclasses. In addition, the transfer of object interactions into a specialized class also improves object reusability.</a:t>
+            </a:r>
+          </a:p>
+          <a:p>
+            <a:r>
+              <a:rPr lang="en-US" dirty="0"/>
+              <a:t>Because the objects do not interact directly, the unit test of the object </a:t>
+            </a:r>
+            <a:r>
+              <a:rPr lang="en-US" altLang="zh-CN" dirty="0"/>
+              <a:t>becomes</a:t>
+            </a:r>
+            <a:r>
+              <a:rPr lang="zh-CN" altLang="en-US" dirty="0"/>
+              <a:t> </a:t>
+            </a:r>
+            <a:r>
+              <a:rPr lang="en-US" altLang="zh-CN" dirty="0"/>
+              <a:t>more</a:t>
+            </a:r>
+            <a:r>
+              <a:rPr lang="en-US" dirty="0"/>
+              <a:t> easier.</a:t>
+            </a:r>
+          </a:p>
+          <a:p>
+            <a:r>
+              <a:rPr lang="en-US" dirty="0"/>
+              <a:t>Low coupling makes the modification of one class not affect other classes.</a:t>
+            </a:r>
+            <a:endParaRPr lang="en-US" dirty="0">
+              <a:latin typeface="微软雅黑" panose="020B0503020204020204" pitchFamily="34" charset="-122"/>
+              <a:ea typeface="微软雅黑" panose="020B0503020204020204" pitchFamily="34" charset="-122"/>
+            </a:endParaRPr>
+          </a:p>
+        </p:txBody>
+      </p:sp>
+    </p:spTree>
+    <p:extLst>
+      <p:ext uri="{BB962C8B-B14F-4D97-AF65-F5344CB8AC3E}">
+        <p14:creationId xmlns:p14="http://schemas.microsoft.com/office/powerpoint/2010/main" val="163476053"/>
       </p:ext>
     </p:extLst>
   </p:cSld>
@@ -19014,6 +19345,15 @@
 </file>
 
 <file path=customXml/item1.xml><?xml version="1.0" encoding="utf-8"?>
+<?mso-contentType ?>
+<FormTemplates xmlns="http://schemas.microsoft.com/sharepoint/v3/contenttype/forms">
+  <Display>DocumentLibraryForm</Display>
+  <Edit>AssetEditForm</Edit>
+  <New>DocumentLibraryForm</New>
+</FormTemplates>
+</file>
+
+<file path=customXml/item2.xml><?xml version="1.0" encoding="utf-8"?>
 <ct:contentTypeSchema xmlns:ct="http://schemas.microsoft.com/office/2006/metadata/contentType" xmlns:ma="http://schemas.microsoft.com/office/2006/metadata/properties/metaAttributes" ct:_="" ma:_="" ma:contentTypeName="TemplateFile" ma:contentTypeID="0x0101006EDDDB5EE6D98C44930B742096920B300400F5B6D36B3EF94B4E9A635CDF2A18F5B8" ma:contentTypeVersion="72" ma:contentTypeDescription="Create a new document." ma:contentTypeScope="" ma:versionID="a23e56308344d904b51738559c3d67c9">
   <xsd:schema xmlns:xsd="http://www.w3.org/2001/XMLSchema" xmlns:xs="http://www.w3.org/2001/XMLSchema" xmlns:p="http://schemas.microsoft.com/office/2006/metadata/properties" xmlns:ns2="4873beb7-5857-4685-be1f-d57550cc96cc" targetNamespace="http://schemas.microsoft.com/office/2006/metadata/properties" ma:root="true" ma:fieldsID="cd0908cc4600e77bf5da051303e00c8d" ns2:_="">
     <xsd:import namespace="4873beb7-5857-4685-be1f-d57550cc96cc"/>
@@ -20053,7 +20393,7 @@
 </ct:contentTypeSchema>
 </file>
 
-<file path=customXml/item2.xml><?xml version="1.0" encoding="utf-8"?>
+<file path=customXml/item3.xml><?xml version="1.0" encoding="utf-8"?>
 <p:properties xmlns:p="http://schemas.microsoft.com/office/2006/metadata/properties" xmlns:xsi="http://www.w3.org/2001/XMLSchema-instance" xmlns:pc="http://schemas.microsoft.com/office/infopath/2007/PartnerControls">
   <documentManagement>
     <APDescription xmlns="4873beb7-5857-4685-be1f-d57550cc96cc" xsi:nil="true"/>
@@ -20179,16 +20519,15 @@
 </p:properties>
 </file>
 
-<file path=customXml/item3.xml><?xml version="1.0" encoding="utf-8"?>
-<?mso-contentType ?>
-<FormTemplates xmlns="http://schemas.microsoft.com/sharepoint/v3/contenttype/forms">
-  <Display>DocumentLibraryForm</Display>
-  <Edit>AssetEditForm</Edit>
-  <New>DocumentLibraryForm</New>
-</FormTemplates>
+<file path=customXml/itemProps1.xml><?xml version="1.0" encoding="utf-8"?>
+<ds:datastoreItem xmlns:ds="http://schemas.openxmlformats.org/officeDocument/2006/customXml" ds:itemID="{561E720F-F05D-4536-9C34-0CFCED65D3B7}">
+  <ds:schemaRefs>
+    <ds:schemaRef ds:uri="http://schemas.microsoft.com/sharepoint/v3/contenttype/forms"/>
+  </ds:schemaRefs>
+</ds:datastoreItem>
 </file>
 
-<file path=customXml/itemProps1.xml><?xml version="1.0" encoding="utf-8"?>
+<file path=customXml/itemProps2.xml><?xml version="1.0" encoding="utf-8"?>
 <ds:datastoreItem xmlns:ds="http://schemas.openxmlformats.org/officeDocument/2006/customXml" ds:itemID="{28C8B9CA-0273-4370-889A-FC05DA5C2FA5}">
   <ds:schemaRefs>
     <ds:schemaRef ds:uri="http://schemas.microsoft.com/office/2006/metadata/contentType"/>
@@ -20206,7 +20545,7 @@
 </ds:datastoreItem>
 </file>
 
-<file path=customXml/itemProps2.xml><?xml version="1.0" encoding="utf-8"?>
+<file path=customXml/itemProps3.xml><?xml version="1.0" encoding="utf-8"?>
 <ds:datastoreItem xmlns:ds="http://schemas.openxmlformats.org/officeDocument/2006/customXml" ds:itemID="{8CDDBB83-77C1-4099-A0AA-289882E745E2}">
   <ds:schemaRefs>
     <ds:schemaRef ds:uri="http://schemas.microsoft.com/office/2006/metadata/properties"/>
@@ -20214,12 +20553,4 @@
     <ds:schemaRef ds:uri="4873beb7-5857-4685-be1f-d57550cc96cc"/>
   </ds:schemaRefs>
 </ds:datastoreItem>
-</file>
-
-<file path=customXml/itemProps3.xml><?xml version="1.0" encoding="utf-8"?>
-<ds:datastoreItem xmlns:ds="http://schemas.openxmlformats.org/officeDocument/2006/customXml" ds:itemID="{561E720F-F05D-4536-9C34-0CFCED65D3B7}">
-  <ds:schemaRefs>
-    <ds:schemaRef ds:uri="http://schemas.microsoft.com/sharepoint/v3/contenttype/forms"/>
-  </ds:schemaRefs>
-</ds:datastoreItem>
 </file>
</xml_diff>